<commit_message>
#15-made changes to the data model for both organization and donation tables
</commit_message>
<xml_diff>
--- a/zakat.icclmd.data/zakat.data.model.pptx
+++ b/zakat.icclmd.data/zakat.data.model.pptx
@@ -36,7 +36,7 @@
             <a:spLocks noGrp="1"/>
           </p:cNvSpPr>
           <p:nvPr>
-            <p:ph type="ftr" idx="2"/>
+            <p:ph type="ftr" idx="1"/>
           </p:nvPr>
         </p:nvSpPr>
         <p:spPr/>
@@ -56,14 +56,14 @@
             <a:spLocks noGrp="1"/>
           </p:cNvSpPr>
           <p:nvPr>
-            <p:ph type="sldNum" idx="3"/>
-          </p:nvPr>
-        </p:nvSpPr>
-        <p:spPr/>
-        <p:txBody>
-          <a:bodyPr/>
-          <a:p>
-            <a:fld id="{53515172-D200-4541-B103-810A27A82990}" type="slidenum">
+            <p:ph type="sldNum" idx="2"/>
+          </p:nvPr>
+        </p:nvSpPr>
+        <p:spPr/>
+        <p:txBody>
+          <a:bodyPr/>
+          <a:p>
+            <a:fld id="{D68632A0-6D92-4360-B512-D1968B24C37C}" type="slidenum">
               <a:t>&lt;#&gt;</a:t>
             </a:fld>
           </a:p>
@@ -76,7 +76,7 @@
             <a:spLocks noGrp="1"/>
           </p:cNvSpPr>
           <p:nvPr>
-            <p:ph type="dt" idx="1"/>
+            <p:ph type="dt" idx="3"/>
           </p:nvPr>
         </p:nvSpPr>
         <p:spPr/>
@@ -114,7 +114,7 @@
       </p:grpSpPr>
       <p:sp>
         <p:nvSpPr>
-          <p:cNvPr id="26" name="PlaceHolder 1"/>
+          <p:cNvPr id="24" name="PlaceHolder 1"/>
           <p:cNvSpPr>
             <a:spLocks noGrp="1"/>
           </p:cNvSpPr>
@@ -125,7 +125,7 @@
         <p:spPr>
           <a:xfrm>
             <a:off x="504000" y="226080"/>
-            <a:ext cx="9071640" cy="946440"/>
+            <a:ext cx="9072000" cy="946440"/>
           </a:xfrm>
           <a:prstGeom prst="rect">
             <a:avLst/>
@@ -140,18 +140,21 @@
             <a:noAutofit/>
           </a:bodyPr>
           <a:p>
-            <a:pPr algn="ctr">
+            <a:pPr indent="0" algn="ctr">
               <a:buNone/>
             </a:pPr>
             <a:endParaRPr b="0" lang="en-US" sz="4400" spc="-1" strike="noStrike">
-              <a:latin typeface="Arial"/>
-            </a:endParaRPr>
-          </a:p>
-        </p:txBody>
-      </p:sp>
-      <p:sp>
-        <p:nvSpPr>
-          <p:cNvPr id="27" name="PlaceHolder 2"/>
+              <a:solidFill>
+                <a:srgbClr val="000000"/>
+              </a:solidFill>
+              <a:latin typeface="Arial"/>
+            </a:endParaRPr>
+          </a:p>
+        </p:txBody>
+      </p:sp>
+      <p:sp>
+        <p:nvSpPr>
+          <p:cNvPr id="25" name="PlaceHolder 2"/>
           <p:cNvSpPr>
             <a:spLocks noGrp="1"/>
           </p:cNvSpPr>
@@ -162,7 +165,7 @@
         <p:spPr>
           <a:xfrm>
             <a:off x="504000" y="1326600"/>
-            <a:ext cx="9071640" cy="1568160"/>
+            <a:ext cx="9072000" cy="1568520"/>
           </a:xfrm>
           <a:prstGeom prst="rect">
             <a:avLst/>
@@ -177,15 +180,24 @@
             <a:normAutofit/>
           </a:bodyPr>
           <a:p>
+            <a:pPr indent="0">
+              <a:spcBef>
+                <a:spcPts val="1417"/>
+              </a:spcBef>
+              <a:buNone/>
+            </a:pPr>
             <a:endParaRPr b="0" lang="en-US" sz="3200" spc="-1" strike="noStrike">
-              <a:latin typeface="Arial"/>
-            </a:endParaRPr>
-          </a:p>
-        </p:txBody>
-      </p:sp>
-      <p:sp>
-        <p:nvSpPr>
-          <p:cNvPr id="28" name="PlaceHolder 3"/>
+              <a:solidFill>
+                <a:srgbClr val="000000"/>
+              </a:solidFill>
+              <a:latin typeface="Arial"/>
+            </a:endParaRPr>
+          </a:p>
+        </p:txBody>
+      </p:sp>
+      <p:sp>
+        <p:nvSpPr>
+          <p:cNvPr id="26" name="PlaceHolder 3"/>
           <p:cNvSpPr>
             <a:spLocks noGrp="1"/>
           </p:cNvSpPr>
@@ -195,8 +207,8 @@
         </p:nvSpPr>
         <p:spPr>
           <a:xfrm>
-            <a:off x="504000" y="3044160"/>
-            <a:ext cx="9071640" cy="1568160"/>
+            <a:off x="504000" y="3044520"/>
+            <a:ext cx="9072000" cy="1568520"/>
           </a:xfrm>
           <a:prstGeom prst="rect">
             <a:avLst/>
@@ -211,7 +223,16 @@
             <a:normAutofit/>
           </a:bodyPr>
           <a:p>
+            <a:pPr indent="0">
+              <a:spcBef>
+                <a:spcPts val="1417"/>
+              </a:spcBef>
+              <a:buNone/>
+            </a:pPr>
             <a:endParaRPr b="0" lang="en-US" sz="3200" spc="-1" strike="noStrike">
+              <a:solidFill>
+                <a:srgbClr val="000000"/>
+              </a:solidFill>
               <a:latin typeface="Arial"/>
             </a:endParaRPr>
           </a:p>
@@ -224,7 +245,7 @@
             <a:spLocks noGrp="1"/>
           </p:cNvSpPr>
           <p:nvPr>
-            <p:ph type="ftr" idx="2"/>
+            <p:ph type="ftr" idx="1"/>
           </p:nvPr>
         </p:nvSpPr>
         <p:spPr/>
@@ -244,14 +265,14 @@
             <a:spLocks noGrp="1"/>
           </p:cNvSpPr>
           <p:nvPr>
-            <p:ph type="sldNum" idx="3"/>
-          </p:nvPr>
-        </p:nvSpPr>
-        <p:spPr/>
-        <p:txBody>
-          <a:bodyPr/>
-          <a:p>
-            <a:fld id="{8331F424-1E6C-44F5-904C-36E90620680A}" type="slidenum">
+            <p:ph type="sldNum" idx="2"/>
+          </p:nvPr>
+        </p:nvSpPr>
+        <p:spPr/>
+        <p:txBody>
+          <a:bodyPr/>
+          <a:p>
+            <a:fld id="{D565D531-51FD-4CCE-B8F9-692291E8573F}" type="slidenum">
               <a:t>&lt;#&gt;</a:t>
             </a:fld>
           </a:p>
@@ -264,7 +285,7 @@
             <a:spLocks noGrp="1"/>
           </p:cNvSpPr>
           <p:nvPr>
-            <p:ph type="dt" idx="1"/>
+            <p:ph type="dt" idx="3"/>
           </p:nvPr>
         </p:nvSpPr>
         <p:spPr/>
@@ -302,7 +323,7 @@
       </p:grpSpPr>
       <p:sp>
         <p:nvSpPr>
-          <p:cNvPr id="29" name="PlaceHolder 1"/>
+          <p:cNvPr id="27" name="PlaceHolder 1"/>
           <p:cNvSpPr>
             <a:spLocks noGrp="1"/>
           </p:cNvSpPr>
@@ -313,7 +334,7 @@
         <p:spPr>
           <a:xfrm>
             <a:off x="504000" y="226080"/>
-            <a:ext cx="9071640" cy="946440"/>
+            <a:ext cx="9072000" cy="946440"/>
           </a:xfrm>
           <a:prstGeom prst="rect">
             <a:avLst/>
@@ -328,18 +349,21 @@
             <a:noAutofit/>
           </a:bodyPr>
           <a:p>
-            <a:pPr algn="ctr">
+            <a:pPr indent="0" algn="ctr">
               <a:buNone/>
             </a:pPr>
             <a:endParaRPr b="0" lang="en-US" sz="4400" spc="-1" strike="noStrike">
-              <a:latin typeface="Arial"/>
-            </a:endParaRPr>
-          </a:p>
-        </p:txBody>
-      </p:sp>
-      <p:sp>
-        <p:nvSpPr>
-          <p:cNvPr id="30" name="PlaceHolder 2"/>
+              <a:solidFill>
+                <a:srgbClr val="000000"/>
+              </a:solidFill>
+              <a:latin typeface="Arial"/>
+            </a:endParaRPr>
+          </a:p>
+        </p:txBody>
+      </p:sp>
+      <p:sp>
+        <p:nvSpPr>
+          <p:cNvPr id="28" name="PlaceHolder 2"/>
           <p:cNvSpPr>
             <a:spLocks noGrp="1"/>
           </p:cNvSpPr>
@@ -350,7 +374,7 @@
         <p:spPr>
           <a:xfrm>
             <a:off x="504000" y="1326600"/>
-            <a:ext cx="4426920" cy="1568160"/>
+            <a:ext cx="4426920" cy="1568520"/>
           </a:xfrm>
           <a:prstGeom prst="rect">
             <a:avLst/>
@@ -365,15 +389,24 @@
             <a:normAutofit/>
           </a:bodyPr>
           <a:p>
+            <a:pPr indent="0">
+              <a:spcBef>
+                <a:spcPts val="1417"/>
+              </a:spcBef>
+              <a:buNone/>
+            </a:pPr>
             <a:endParaRPr b="0" lang="en-US" sz="3200" spc="-1" strike="noStrike">
-              <a:latin typeface="Arial"/>
-            </a:endParaRPr>
-          </a:p>
-        </p:txBody>
-      </p:sp>
-      <p:sp>
-        <p:nvSpPr>
-          <p:cNvPr id="31" name="PlaceHolder 3"/>
+              <a:solidFill>
+                <a:srgbClr val="000000"/>
+              </a:solidFill>
+              <a:latin typeface="Arial"/>
+            </a:endParaRPr>
+          </a:p>
+        </p:txBody>
+      </p:sp>
+      <p:sp>
+        <p:nvSpPr>
+          <p:cNvPr id="29" name="PlaceHolder 3"/>
           <p:cNvSpPr>
             <a:spLocks noGrp="1"/>
           </p:cNvSpPr>
@@ -384,7 +417,7 @@
         <p:spPr>
           <a:xfrm>
             <a:off x="5152680" y="1326600"/>
-            <a:ext cx="4426920" cy="1568160"/>
+            <a:ext cx="4426920" cy="1568520"/>
           </a:xfrm>
           <a:prstGeom prst="rect">
             <a:avLst/>
@@ -399,15 +432,24 @@
             <a:normAutofit/>
           </a:bodyPr>
           <a:p>
+            <a:pPr indent="0">
+              <a:spcBef>
+                <a:spcPts val="1417"/>
+              </a:spcBef>
+              <a:buNone/>
+            </a:pPr>
             <a:endParaRPr b="0" lang="en-US" sz="3200" spc="-1" strike="noStrike">
-              <a:latin typeface="Arial"/>
-            </a:endParaRPr>
-          </a:p>
-        </p:txBody>
-      </p:sp>
-      <p:sp>
-        <p:nvSpPr>
-          <p:cNvPr id="32" name="PlaceHolder 4"/>
+              <a:solidFill>
+                <a:srgbClr val="000000"/>
+              </a:solidFill>
+              <a:latin typeface="Arial"/>
+            </a:endParaRPr>
+          </a:p>
+        </p:txBody>
+      </p:sp>
+      <p:sp>
+        <p:nvSpPr>
+          <p:cNvPr id="30" name="PlaceHolder 4"/>
           <p:cNvSpPr>
             <a:spLocks noGrp="1"/>
           </p:cNvSpPr>
@@ -417,8 +459,8 @@
         </p:nvSpPr>
         <p:spPr>
           <a:xfrm>
-            <a:off x="504000" y="3044160"/>
-            <a:ext cx="4426920" cy="1568160"/>
+            <a:off x="504000" y="3044520"/>
+            <a:ext cx="4426920" cy="1568520"/>
           </a:xfrm>
           <a:prstGeom prst="rect">
             <a:avLst/>
@@ -433,15 +475,24 @@
             <a:normAutofit/>
           </a:bodyPr>
           <a:p>
+            <a:pPr indent="0">
+              <a:spcBef>
+                <a:spcPts val="1417"/>
+              </a:spcBef>
+              <a:buNone/>
+            </a:pPr>
             <a:endParaRPr b="0" lang="en-US" sz="3200" spc="-1" strike="noStrike">
-              <a:latin typeface="Arial"/>
-            </a:endParaRPr>
-          </a:p>
-        </p:txBody>
-      </p:sp>
-      <p:sp>
-        <p:nvSpPr>
-          <p:cNvPr id="33" name="PlaceHolder 5"/>
+              <a:solidFill>
+                <a:srgbClr val="000000"/>
+              </a:solidFill>
+              <a:latin typeface="Arial"/>
+            </a:endParaRPr>
+          </a:p>
+        </p:txBody>
+      </p:sp>
+      <p:sp>
+        <p:nvSpPr>
+          <p:cNvPr id="31" name="PlaceHolder 5"/>
           <p:cNvSpPr>
             <a:spLocks noGrp="1"/>
           </p:cNvSpPr>
@@ -451,8 +502,8 @@
         </p:nvSpPr>
         <p:spPr>
           <a:xfrm>
-            <a:off x="5152680" y="3044160"/>
-            <a:ext cx="4426920" cy="1568160"/>
+            <a:off x="5152680" y="3044520"/>
+            <a:ext cx="4426920" cy="1568520"/>
           </a:xfrm>
           <a:prstGeom prst="rect">
             <a:avLst/>
@@ -467,7 +518,16 @@
             <a:normAutofit/>
           </a:bodyPr>
           <a:p>
+            <a:pPr indent="0">
+              <a:spcBef>
+                <a:spcPts val="1417"/>
+              </a:spcBef>
+              <a:buNone/>
+            </a:pPr>
             <a:endParaRPr b="0" lang="en-US" sz="3200" spc="-1" strike="noStrike">
+              <a:solidFill>
+                <a:srgbClr val="000000"/>
+              </a:solidFill>
               <a:latin typeface="Arial"/>
             </a:endParaRPr>
           </a:p>
@@ -480,7 +540,7 @@
             <a:spLocks noGrp="1"/>
           </p:cNvSpPr>
           <p:nvPr>
-            <p:ph type="ftr" idx="2"/>
+            <p:ph type="ftr" idx="1"/>
           </p:nvPr>
         </p:nvSpPr>
         <p:spPr/>
@@ -500,14 +560,14 @@
             <a:spLocks noGrp="1"/>
           </p:cNvSpPr>
           <p:nvPr>
-            <p:ph type="sldNum" idx="3"/>
-          </p:nvPr>
-        </p:nvSpPr>
-        <p:spPr/>
-        <p:txBody>
-          <a:bodyPr/>
-          <a:p>
-            <a:fld id="{1CA2685E-085B-41D2-972E-967E5FC2F9B6}" type="slidenum">
+            <p:ph type="sldNum" idx="2"/>
+          </p:nvPr>
+        </p:nvSpPr>
+        <p:spPr/>
+        <p:txBody>
+          <a:bodyPr/>
+          <a:p>
+            <a:fld id="{DC51CBB2-A2A3-4564-84A1-146D7B61141C}" type="slidenum">
               <a:t>&lt;#&gt;</a:t>
             </a:fld>
           </a:p>
@@ -520,7 +580,7 @@
             <a:spLocks noGrp="1"/>
           </p:cNvSpPr>
           <p:nvPr>
-            <p:ph type="dt" idx="1"/>
+            <p:ph type="dt" idx="3"/>
           </p:nvPr>
         </p:nvSpPr>
         <p:spPr/>
@@ -558,7 +618,7 @@
       </p:grpSpPr>
       <p:sp>
         <p:nvSpPr>
-          <p:cNvPr id="34" name="PlaceHolder 1"/>
+          <p:cNvPr id="32" name="PlaceHolder 1"/>
           <p:cNvSpPr>
             <a:spLocks noGrp="1"/>
           </p:cNvSpPr>
@@ -569,7 +629,7 @@
         <p:spPr>
           <a:xfrm>
             <a:off x="504000" y="226080"/>
-            <a:ext cx="9071640" cy="946440"/>
+            <a:ext cx="9072000" cy="946440"/>
           </a:xfrm>
           <a:prstGeom prst="rect">
             <a:avLst/>
@@ -584,18 +644,21 @@
             <a:noAutofit/>
           </a:bodyPr>
           <a:p>
-            <a:pPr algn="ctr">
+            <a:pPr indent="0" algn="ctr">
               <a:buNone/>
             </a:pPr>
             <a:endParaRPr b="0" lang="en-US" sz="4400" spc="-1" strike="noStrike">
-              <a:latin typeface="Arial"/>
-            </a:endParaRPr>
-          </a:p>
-        </p:txBody>
-      </p:sp>
-      <p:sp>
-        <p:nvSpPr>
-          <p:cNvPr id="35" name="PlaceHolder 2"/>
+              <a:solidFill>
+                <a:srgbClr val="000000"/>
+              </a:solidFill>
+              <a:latin typeface="Arial"/>
+            </a:endParaRPr>
+          </a:p>
+        </p:txBody>
+      </p:sp>
+      <p:sp>
+        <p:nvSpPr>
+          <p:cNvPr id="33" name="PlaceHolder 2"/>
           <p:cNvSpPr>
             <a:spLocks noGrp="1"/>
           </p:cNvSpPr>
@@ -606,7 +669,7 @@
         <p:spPr>
           <a:xfrm>
             <a:off x="504000" y="1326600"/>
-            <a:ext cx="2920680" cy="1568160"/>
+            <a:ext cx="2921040" cy="1568520"/>
           </a:xfrm>
           <a:prstGeom prst="rect">
             <a:avLst/>
@@ -621,15 +684,24 @@
             <a:normAutofit/>
           </a:bodyPr>
           <a:p>
+            <a:pPr indent="0">
+              <a:spcBef>
+                <a:spcPts val="1417"/>
+              </a:spcBef>
+              <a:buNone/>
+            </a:pPr>
             <a:endParaRPr b="0" lang="en-US" sz="3200" spc="-1" strike="noStrike">
-              <a:latin typeface="Arial"/>
-            </a:endParaRPr>
-          </a:p>
-        </p:txBody>
-      </p:sp>
-      <p:sp>
-        <p:nvSpPr>
-          <p:cNvPr id="36" name="PlaceHolder 3"/>
+              <a:solidFill>
+                <a:srgbClr val="000000"/>
+              </a:solidFill>
+              <a:latin typeface="Arial"/>
+            </a:endParaRPr>
+          </a:p>
+        </p:txBody>
+      </p:sp>
+      <p:sp>
+        <p:nvSpPr>
+          <p:cNvPr id="34" name="PlaceHolder 3"/>
           <p:cNvSpPr>
             <a:spLocks noGrp="1"/>
           </p:cNvSpPr>
@@ -639,8 +711,8 @@
         </p:nvSpPr>
         <p:spPr>
           <a:xfrm>
-            <a:off x="3571200" y="1326600"/>
-            <a:ext cx="2920680" cy="1568160"/>
+            <a:off x="3571560" y="1326600"/>
+            <a:ext cx="2921040" cy="1568520"/>
           </a:xfrm>
           <a:prstGeom prst="rect">
             <a:avLst/>
@@ -655,15 +727,24 @@
             <a:normAutofit/>
           </a:bodyPr>
           <a:p>
+            <a:pPr indent="0">
+              <a:spcBef>
+                <a:spcPts val="1417"/>
+              </a:spcBef>
+              <a:buNone/>
+            </a:pPr>
             <a:endParaRPr b="0" lang="en-US" sz="3200" spc="-1" strike="noStrike">
-              <a:latin typeface="Arial"/>
-            </a:endParaRPr>
-          </a:p>
-        </p:txBody>
-      </p:sp>
-      <p:sp>
-        <p:nvSpPr>
-          <p:cNvPr id="37" name="PlaceHolder 4"/>
+              <a:solidFill>
+                <a:srgbClr val="000000"/>
+              </a:solidFill>
+              <a:latin typeface="Arial"/>
+            </a:endParaRPr>
+          </a:p>
+        </p:txBody>
+      </p:sp>
+      <p:sp>
+        <p:nvSpPr>
+          <p:cNvPr id="35" name="PlaceHolder 4"/>
           <p:cNvSpPr>
             <a:spLocks noGrp="1"/>
           </p:cNvSpPr>
@@ -673,8 +754,8 @@
         </p:nvSpPr>
         <p:spPr>
           <a:xfrm>
-            <a:off x="6638040" y="1326600"/>
-            <a:ext cx="2920680" cy="1568160"/>
+            <a:off x="6639120" y="1326600"/>
+            <a:ext cx="2921040" cy="1568520"/>
           </a:xfrm>
           <a:prstGeom prst="rect">
             <a:avLst/>
@@ -689,15 +770,24 @@
             <a:normAutofit/>
           </a:bodyPr>
           <a:p>
+            <a:pPr indent="0">
+              <a:spcBef>
+                <a:spcPts val="1417"/>
+              </a:spcBef>
+              <a:buNone/>
+            </a:pPr>
             <a:endParaRPr b="0" lang="en-US" sz="3200" spc="-1" strike="noStrike">
-              <a:latin typeface="Arial"/>
-            </a:endParaRPr>
-          </a:p>
-        </p:txBody>
-      </p:sp>
-      <p:sp>
-        <p:nvSpPr>
-          <p:cNvPr id="38" name="PlaceHolder 5"/>
+              <a:solidFill>
+                <a:srgbClr val="000000"/>
+              </a:solidFill>
+              <a:latin typeface="Arial"/>
+            </a:endParaRPr>
+          </a:p>
+        </p:txBody>
+      </p:sp>
+      <p:sp>
+        <p:nvSpPr>
+          <p:cNvPr id="36" name="PlaceHolder 5"/>
           <p:cNvSpPr>
             <a:spLocks noGrp="1"/>
           </p:cNvSpPr>
@@ -707,8 +797,8 @@
         </p:nvSpPr>
         <p:spPr>
           <a:xfrm>
-            <a:off x="504000" y="3044160"/>
-            <a:ext cx="2920680" cy="1568160"/>
+            <a:off x="504000" y="3044520"/>
+            <a:ext cx="2921040" cy="1568520"/>
           </a:xfrm>
           <a:prstGeom prst="rect">
             <a:avLst/>
@@ -723,15 +813,24 @@
             <a:normAutofit/>
           </a:bodyPr>
           <a:p>
+            <a:pPr indent="0">
+              <a:spcBef>
+                <a:spcPts val="1417"/>
+              </a:spcBef>
+              <a:buNone/>
+            </a:pPr>
             <a:endParaRPr b="0" lang="en-US" sz="3200" spc="-1" strike="noStrike">
-              <a:latin typeface="Arial"/>
-            </a:endParaRPr>
-          </a:p>
-        </p:txBody>
-      </p:sp>
-      <p:sp>
-        <p:nvSpPr>
-          <p:cNvPr id="39" name="PlaceHolder 6"/>
+              <a:solidFill>
+                <a:srgbClr val="000000"/>
+              </a:solidFill>
+              <a:latin typeface="Arial"/>
+            </a:endParaRPr>
+          </a:p>
+        </p:txBody>
+      </p:sp>
+      <p:sp>
+        <p:nvSpPr>
+          <p:cNvPr id="37" name="PlaceHolder 6"/>
           <p:cNvSpPr>
             <a:spLocks noGrp="1"/>
           </p:cNvSpPr>
@@ -741,8 +840,8 @@
         </p:nvSpPr>
         <p:spPr>
           <a:xfrm>
-            <a:off x="3571200" y="3044160"/>
-            <a:ext cx="2920680" cy="1568160"/>
+            <a:off x="3571560" y="3044520"/>
+            <a:ext cx="2921040" cy="1568520"/>
           </a:xfrm>
           <a:prstGeom prst="rect">
             <a:avLst/>
@@ -757,15 +856,24 @@
             <a:normAutofit/>
           </a:bodyPr>
           <a:p>
+            <a:pPr indent="0">
+              <a:spcBef>
+                <a:spcPts val="1417"/>
+              </a:spcBef>
+              <a:buNone/>
+            </a:pPr>
             <a:endParaRPr b="0" lang="en-US" sz="3200" spc="-1" strike="noStrike">
-              <a:latin typeface="Arial"/>
-            </a:endParaRPr>
-          </a:p>
-        </p:txBody>
-      </p:sp>
-      <p:sp>
-        <p:nvSpPr>
-          <p:cNvPr id="40" name="PlaceHolder 7"/>
+              <a:solidFill>
+                <a:srgbClr val="000000"/>
+              </a:solidFill>
+              <a:latin typeface="Arial"/>
+            </a:endParaRPr>
+          </a:p>
+        </p:txBody>
+      </p:sp>
+      <p:sp>
+        <p:nvSpPr>
+          <p:cNvPr id="38" name="PlaceHolder 7"/>
           <p:cNvSpPr>
             <a:spLocks noGrp="1"/>
           </p:cNvSpPr>
@@ -775,8 +883,8 @@
         </p:nvSpPr>
         <p:spPr>
           <a:xfrm>
-            <a:off x="6638040" y="3044160"/>
-            <a:ext cx="2920680" cy="1568160"/>
+            <a:off x="6639120" y="3044520"/>
+            <a:ext cx="2921040" cy="1568520"/>
           </a:xfrm>
           <a:prstGeom prst="rect">
             <a:avLst/>
@@ -791,7 +899,16 @@
             <a:normAutofit/>
           </a:bodyPr>
           <a:p>
+            <a:pPr indent="0">
+              <a:spcBef>
+                <a:spcPts val="1417"/>
+              </a:spcBef>
+              <a:buNone/>
+            </a:pPr>
             <a:endParaRPr b="0" lang="en-US" sz="3200" spc="-1" strike="noStrike">
+              <a:solidFill>
+                <a:srgbClr val="000000"/>
+              </a:solidFill>
               <a:latin typeface="Arial"/>
             </a:endParaRPr>
           </a:p>
@@ -804,7 +921,7 @@
             <a:spLocks noGrp="1"/>
           </p:cNvSpPr>
           <p:nvPr>
-            <p:ph type="ftr" idx="2"/>
+            <p:ph type="ftr" idx="1"/>
           </p:nvPr>
         </p:nvSpPr>
         <p:spPr/>
@@ -824,14 +941,14 @@
             <a:spLocks noGrp="1"/>
           </p:cNvSpPr>
           <p:nvPr>
-            <p:ph type="sldNum" idx="3"/>
-          </p:nvPr>
-        </p:nvSpPr>
-        <p:spPr/>
-        <p:txBody>
-          <a:bodyPr/>
-          <a:p>
-            <a:fld id="{797CC7FB-8CB8-4A01-A684-382B9131663A}" type="slidenum">
+            <p:ph type="sldNum" idx="2"/>
+          </p:nvPr>
+        </p:nvSpPr>
+        <p:spPr/>
+        <p:txBody>
+          <a:bodyPr/>
+          <a:p>
+            <a:fld id="{FA51F155-96B4-4B42-8AE8-E59F8724B468}" type="slidenum">
               <a:t>&lt;#&gt;</a:t>
             </a:fld>
           </a:p>
@@ -844,7 +961,7 @@
             <a:spLocks noGrp="1"/>
           </p:cNvSpPr>
           <p:nvPr>
-            <p:ph type="dt" idx="1"/>
+            <p:ph type="dt" idx="3"/>
           </p:nvPr>
         </p:nvSpPr>
         <p:spPr/>
@@ -882,7 +999,7 @@
       </p:grpSpPr>
       <p:sp>
         <p:nvSpPr>
-          <p:cNvPr id="5" name="PlaceHolder 1"/>
+          <p:cNvPr id="3" name="PlaceHolder 1"/>
           <p:cNvSpPr>
             <a:spLocks noGrp="1"/>
           </p:cNvSpPr>
@@ -893,7 +1010,7 @@
         <p:spPr>
           <a:xfrm>
             <a:off x="504000" y="226080"/>
-            <a:ext cx="9071640" cy="946440"/>
+            <a:ext cx="9072000" cy="946440"/>
           </a:xfrm>
           <a:prstGeom prst="rect">
             <a:avLst/>
@@ -908,18 +1025,21 @@
             <a:noAutofit/>
           </a:bodyPr>
           <a:p>
-            <a:pPr algn="ctr">
+            <a:pPr indent="0" algn="ctr">
               <a:buNone/>
             </a:pPr>
             <a:endParaRPr b="0" lang="en-US" sz="4400" spc="-1" strike="noStrike">
-              <a:latin typeface="Arial"/>
-            </a:endParaRPr>
-          </a:p>
-        </p:txBody>
-      </p:sp>
-      <p:sp>
-        <p:nvSpPr>
-          <p:cNvPr id="6" name="PlaceHolder 2"/>
+              <a:solidFill>
+                <a:srgbClr val="000000"/>
+              </a:solidFill>
+              <a:latin typeface="Arial"/>
+            </a:endParaRPr>
+          </a:p>
+        </p:txBody>
+      </p:sp>
+      <p:sp>
+        <p:nvSpPr>
+          <p:cNvPr id="4" name="PlaceHolder 2"/>
           <p:cNvSpPr>
             <a:spLocks noGrp="1"/>
           </p:cNvSpPr>
@@ -930,7 +1050,7 @@
         <p:spPr>
           <a:xfrm>
             <a:off x="504000" y="1326600"/>
-            <a:ext cx="9071640" cy="3288240"/>
+            <a:ext cx="9072000" cy="3288600"/>
           </a:xfrm>
           <a:prstGeom prst="rect">
             <a:avLst/>
@@ -945,10 +1065,13 @@
             <a:noAutofit/>
           </a:bodyPr>
           <a:p>
-            <a:pPr algn="ctr">
+            <a:pPr indent="0" algn="ctr">
               <a:buNone/>
             </a:pPr>
             <a:endParaRPr b="0" lang="en-US" sz="3200" spc="-1" strike="noStrike">
+              <a:solidFill>
+                <a:srgbClr val="000000"/>
+              </a:solidFill>
               <a:latin typeface="Arial"/>
             </a:endParaRPr>
           </a:p>
@@ -961,7 +1084,7 @@
             <a:spLocks noGrp="1"/>
           </p:cNvSpPr>
           <p:nvPr>
-            <p:ph type="ftr" idx="2"/>
+            <p:ph type="ftr" idx="1"/>
           </p:nvPr>
         </p:nvSpPr>
         <p:spPr/>
@@ -981,14 +1104,14 @@
             <a:spLocks noGrp="1"/>
           </p:cNvSpPr>
           <p:nvPr>
-            <p:ph type="sldNum" idx="3"/>
-          </p:nvPr>
-        </p:nvSpPr>
-        <p:spPr/>
-        <p:txBody>
-          <a:bodyPr/>
-          <a:p>
-            <a:fld id="{1BFAA72E-3EE9-434F-A696-9DC787C4F1A2}" type="slidenum">
+            <p:ph type="sldNum" idx="2"/>
+          </p:nvPr>
+        </p:nvSpPr>
+        <p:spPr/>
+        <p:txBody>
+          <a:bodyPr/>
+          <a:p>
+            <a:fld id="{C22D12F7-1819-4960-A1D9-3357A7A7D10C}" type="slidenum">
               <a:t>&lt;#&gt;</a:t>
             </a:fld>
           </a:p>
@@ -1001,7 +1124,7 @@
             <a:spLocks noGrp="1"/>
           </p:cNvSpPr>
           <p:nvPr>
-            <p:ph type="dt" idx="1"/>
+            <p:ph type="dt" idx="3"/>
           </p:nvPr>
         </p:nvSpPr>
         <p:spPr/>
@@ -1039,7 +1162,7 @@
       </p:grpSpPr>
       <p:sp>
         <p:nvSpPr>
-          <p:cNvPr id="7" name="PlaceHolder 1"/>
+          <p:cNvPr id="5" name="PlaceHolder 1"/>
           <p:cNvSpPr>
             <a:spLocks noGrp="1"/>
           </p:cNvSpPr>
@@ -1050,7 +1173,7 @@
         <p:spPr>
           <a:xfrm>
             <a:off x="504000" y="226080"/>
-            <a:ext cx="9071640" cy="946440"/>
+            <a:ext cx="9072000" cy="946440"/>
           </a:xfrm>
           <a:prstGeom prst="rect">
             <a:avLst/>
@@ -1065,18 +1188,21 @@
             <a:noAutofit/>
           </a:bodyPr>
           <a:p>
-            <a:pPr algn="ctr">
+            <a:pPr indent="0" algn="ctr">
               <a:buNone/>
             </a:pPr>
             <a:endParaRPr b="0" lang="en-US" sz="4400" spc="-1" strike="noStrike">
-              <a:latin typeface="Arial"/>
-            </a:endParaRPr>
-          </a:p>
-        </p:txBody>
-      </p:sp>
-      <p:sp>
-        <p:nvSpPr>
-          <p:cNvPr id="8" name="PlaceHolder 2"/>
+              <a:solidFill>
+                <a:srgbClr val="000000"/>
+              </a:solidFill>
+              <a:latin typeface="Arial"/>
+            </a:endParaRPr>
+          </a:p>
+        </p:txBody>
+      </p:sp>
+      <p:sp>
+        <p:nvSpPr>
+          <p:cNvPr id="6" name="PlaceHolder 2"/>
           <p:cNvSpPr>
             <a:spLocks noGrp="1"/>
           </p:cNvSpPr>
@@ -1087,7 +1213,7 @@
         <p:spPr>
           <a:xfrm>
             <a:off x="504000" y="1326600"/>
-            <a:ext cx="9071640" cy="3288240"/>
+            <a:ext cx="9072000" cy="3288600"/>
           </a:xfrm>
           <a:prstGeom prst="rect">
             <a:avLst/>
@@ -1102,7 +1228,16 @@
             <a:normAutofit/>
           </a:bodyPr>
           <a:p>
+            <a:pPr indent="0">
+              <a:spcBef>
+                <a:spcPts val="1417"/>
+              </a:spcBef>
+              <a:buNone/>
+            </a:pPr>
             <a:endParaRPr b="0" lang="en-US" sz="3200" spc="-1" strike="noStrike">
+              <a:solidFill>
+                <a:srgbClr val="000000"/>
+              </a:solidFill>
               <a:latin typeface="Arial"/>
             </a:endParaRPr>
           </a:p>
@@ -1115,7 +1250,7 @@
             <a:spLocks noGrp="1"/>
           </p:cNvSpPr>
           <p:nvPr>
-            <p:ph type="ftr" idx="2"/>
+            <p:ph type="ftr" idx="1"/>
           </p:nvPr>
         </p:nvSpPr>
         <p:spPr/>
@@ -1135,14 +1270,14 @@
             <a:spLocks noGrp="1"/>
           </p:cNvSpPr>
           <p:nvPr>
-            <p:ph type="sldNum" idx="3"/>
-          </p:nvPr>
-        </p:nvSpPr>
-        <p:spPr/>
-        <p:txBody>
-          <a:bodyPr/>
-          <a:p>
-            <a:fld id="{DEA4C372-8AC4-43EE-BF91-F9C19D67D8DE}" type="slidenum">
+            <p:ph type="sldNum" idx="2"/>
+          </p:nvPr>
+        </p:nvSpPr>
+        <p:spPr/>
+        <p:txBody>
+          <a:bodyPr/>
+          <a:p>
+            <a:fld id="{10D53723-CD5C-40A1-8E54-5D522938B12D}" type="slidenum">
               <a:t>&lt;#&gt;</a:t>
             </a:fld>
           </a:p>
@@ -1155,7 +1290,7 @@
             <a:spLocks noGrp="1"/>
           </p:cNvSpPr>
           <p:nvPr>
-            <p:ph type="dt" idx="1"/>
+            <p:ph type="dt" idx="3"/>
           </p:nvPr>
         </p:nvSpPr>
         <p:spPr/>
@@ -1193,7 +1328,7 @@
       </p:grpSpPr>
       <p:sp>
         <p:nvSpPr>
-          <p:cNvPr id="9" name="PlaceHolder 1"/>
+          <p:cNvPr id="7" name="PlaceHolder 1"/>
           <p:cNvSpPr>
             <a:spLocks noGrp="1"/>
           </p:cNvSpPr>
@@ -1204,7 +1339,7 @@
         <p:spPr>
           <a:xfrm>
             <a:off x="504000" y="226080"/>
-            <a:ext cx="9071640" cy="946440"/>
+            <a:ext cx="9072000" cy="946440"/>
           </a:xfrm>
           <a:prstGeom prst="rect">
             <a:avLst/>
@@ -1219,18 +1354,21 @@
             <a:noAutofit/>
           </a:bodyPr>
           <a:p>
-            <a:pPr algn="ctr">
+            <a:pPr indent="0" algn="ctr">
               <a:buNone/>
             </a:pPr>
             <a:endParaRPr b="0" lang="en-US" sz="4400" spc="-1" strike="noStrike">
-              <a:latin typeface="Arial"/>
-            </a:endParaRPr>
-          </a:p>
-        </p:txBody>
-      </p:sp>
-      <p:sp>
-        <p:nvSpPr>
-          <p:cNvPr id="10" name="PlaceHolder 2"/>
+              <a:solidFill>
+                <a:srgbClr val="000000"/>
+              </a:solidFill>
+              <a:latin typeface="Arial"/>
+            </a:endParaRPr>
+          </a:p>
+        </p:txBody>
+      </p:sp>
+      <p:sp>
+        <p:nvSpPr>
+          <p:cNvPr id="8" name="PlaceHolder 2"/>
           <p:cNvSpPr>
             <a:spLocks noGrp="1"/>
           </p:cNvSpPr>
@@ -1241,7 +1379,7 @@
         <p:spPr>
           <a:xfrm>
             <a:off x="504000" y="1326600"/>
-            <a:ext cx="4426920" cy="3288240"/>
+            <a:ext cx="4426920" cy="3288600"/>
           </a:xfrm>
           <a:prstGeom prst="rect">
             <a:avLst/>
@@ -1256,15 +1394,24 @@
             <a:normAutofit/>
           </a:bodyPr>
           <a:p>
+            <a:pPr indent="0">
+              <a:spcBef>
+                <a:spcPts val="1417"/>
+              </a:spcBef>
+              <a:buNone/>
+            </a:pPr>
             <a:endParaRPr b="0" lang="en-US" sz="3200" spc="-1" strike="noStrike">
-              <a:latin typeface="Arial"/>
-            </a:endParaRPr>
-          </a:p>
-        </p:txBody>
-      </p:sp>
-      <p:sp>
-        <p:nvSpPr>
-          <p:cNvPr id="11" name="PlaceHolder 3"/>
+              <a:solidFill>
+                <a:srgbClr val="000000"/>
+              </a:solidFill>
+              <a:latin typeface="Arial"/>
+            </a:endParaRPr>
+          </a:p>
+        </p:txBody>
+      </p:sp>
+      <p:sp>
+        <p:nvSpPr>
+          <p:cNvPr id="9" name="PlaceHolder 3"/>
           <p:cNvSpPr>
             <a:spLocks noGrp="1"/>
           </p:cNvSpPr>
@@ -1275,7 +1422,7 @@
         <p:spPr>
           <a:xfrm>
             <a:off x="5152680" y="1326600"/>
-            <a:ext cx="4426920" cy="3288240"/>
+            <a:ext cx="4426920" cy="3288600"/>
           </a:xfrm>
           <a:prstGeom prst="rect">
             <a:avLst/>
@@ -1290,7 +1437,16 @@
             <a:normAutofit/>
           </a:bodyPr>
           <a:p>
+            <a:pPr indent="0">
+              <a:spcBef>
+                <a:spcPts val="1417"/>
+              </a:spcBef>
+              <a:buNone/>
+            </a:pPr>
             <a:endParaRPr b="0" lang="en-US" sz="3200" spc="-1" strike="noStrike">
+              <a:solidFill>
+                <a:srgbClr val="000000"/>
+              </a:solidFill>
               <a:latin typeface="Arial"/>
             </a:endParaRPr>
           </a:p>
@@ -1303,7 +1459,7 @@
             <a:spLocks noGrp="1"/>
           </p:cNvSpPr>
           <p:nvPr>
-            <p:ph type="ftr" idx="2"/>
+            <p:ph type="ftr" idx="1"/>
           </p:nvPr>
         </p:nvSpPr>
         <p:spPr/>
@@ -1323,14 +1479,14 @@
             <a:spLocks noGrp="1"/>
           </p:cNvSpPr>
           <p:nvPr>
-            <p:ph type="sldNum" idx="3"/>
-          </p:nvPr>
-        </p:nvSpPr>
-        <p:spPr/>
-        <p:txBody>
-          <a:bodyPr/>
-          <a:p>
-            <a:fld id="{915FC2E6-AA20-4606-81D3-C57E1E23D631}" type="slidenum">
+            <p:ph type="sldNum" idx="2"/>
+          </p:nvPr>
+        </p:nvSpPr>
+        <p:spPr/>
+        <p:txBody>
+          <a:bodyPr/>
+          <a:p>
+            <a:fld id="{AC0B285C-F92F-4B3F-9DE6-1DEB286232D9}" type="slidenum">
               <a:t>&lt;#&gt;</a:t>
             </a:fld>
           </a:p>
@@ -1343,7 +1499,7 @@
             <a:spLocks noGrp="1"/>
           </p:cNvSpPr>
           <p:nvPr>
-            <p:ph type="dt" idx="1"/>
+            <p:ph type="dt" idx="3"/>
           </p:nvPr>
         </p:nvSpPr>
         <p:spPr/>
@@ -1381,7 +1537,7 @@
       </p:grpSpPr>
       <p:sp>
         <p:nvSpPr>
-          <p:cNvPr id="12" name="PlaceHolder 1"/>
+          <p:cNvPr id="10" name="PlaceHolder 1"/>
           <p:cNvSpPr>
             <a:spLocks noGrp="1"/>
           </p:cNvSpPr>
@@ -1392,7 +1548,7 @@
         <p:spPr>
           <a:xfrm>
             <a:off x="504000" y="226080"/>
-            <a:ext cx="9071640" cy="946440"/>
+            <a:ext cx="9072000" cy="946440"/>
           </a:xfrm>
           <a:prstGeom prst="rect">
             <a:avLst/>
@@ -1407,10 +1563,13 @@
             <a:noAutofit/>
           </a:bodyPr>
           <a:p>
-            <a:pPr algn="ctr">
+            <a:pPr indent="0" algn="ctr">
               <a:buNone/>
             </a:pPr>
             <a:endParaRPr b="0" lang="en-US" sz="4400" spc="-1" strike="noStrike">
+              <a:solidFill>
+                <a:srgbClr val="000000"/>
+              </a:solidFill>
               <a:latin typeface="Arial"/>
             </a:endParaRPr>
           </a:p>
@@ -1423,7 +1582,7 @@
             <a:spLocks noGrp="1"/>
           </p:cNvSpPr>
           <p:nvPr>
-            <p:ph type="ftr" idx="2"/>
+            <p:ph type="ftr" idx="1"/>
           </p:nvPr>
         </p:nvSpPr>
         <p:spPr/>
@@ -1443,14 +1602,14 @@
             <a:spLocks noGrp="1"/>
           </p:cNvSpPr>
           <p:nvPr>
-            <p:ph type="sldNum" idx="3"/>
-          </p:nvPr>
-        </p:nvSpPr>
-        <p:spPr/>
-        <p:txBody>
-          <a:bodyPr/>
-          <a:p>
-            <a:fld id="{2AEE10BE-BCA0-43FC-9773-490EB7C771EE}" type="slidenum">
+            <p:ph type="sldNum" idx="2"/>
+          </p:nvPr>
+        </p:nvSpPr>
+        <p:spPr/>
+        <p:txBody>
+          <a:bodyPr/>
+          <a:p>
+            <a:fld id="{8C45F138-9507-41EE-81AB-F70C5BC10A79}" type="slidenum">
               <a:t>&lt;#&gt;</a:t>
             </a:fld>
           </a:p>
@@ -1463,7 +1622,7 @@
             <a:spLocks noGrp="1"/>
           </p:cNvSpPr>
           <p:nvPr>
-            <p:ph type="dt" idx="1"/>
+            <p:ph type="dt" idx="3"/>
           </p:nvPr>
         </p:nvSpPr>
         <p:spPr/>
@@ -1501,7 +1660,7 @@
       </p:grpSpPr>
       <p:sp>
         <p:nvSpPr>
-          <p:cNvPr id="13" name="PlaceHolder 1"/>
+          <p:cNvPr id="11" name="PlaceHolder 1"/>
           <p:cNvSpPr>
             <a:spLocks noGrp="1"/>
           </p:cNvSpPr>
@@ -1512,7 +1671,7 @@
         <p:spPr>
           <a:xfrm>
             <a:off x="504000" y="226080"/>
-            <a:ext cx="9071640" cy="4388400"/>
+            <a:ext cx="9072000" cy="4388400"/>
           </a:xfrm>
           <a:prstGeom prst="rect">
             <a:avLst/>
@@ -1527,10 +1686,11 @@
             <a:noAutofit/>
           </a:bodyPr>
           <a:p>
-            <a:pPr algn="ctr">
-              <a:buNone/>
-            </a:pPr>
+            <a:pPr algn="ctr"/>
             <a:endParaRPr b="0" lang="en-US" sz="3200" spc="-1" strike="noStrike">
+              <a:solidFill>
+                <a:srgbClr val="000000"/>
+              </a:solidFill>
               <a:latin typeface="Arial"/>
             </a:endParaRPr>
           </a:p>
@@ -1543,7 +1703,7 @@
             <a:spLocks noGrp="1"/>
           </p:cNvSpPr>
           <p:nvPr>
-            <p:ph type="ftr" idx="2"/>
+            <p:ph type="ftr" idx="1"/>
           </p:nvPr>
         </p:nvSpPr>
         <p:spPr/>
@@ -1563,14 +1723,14 @@
             <a:spLocks noGrp="1"/>
           </p:cNvSpPr>
           <p:nvPr>
-            <p:ph type="sldNum" idx="3"/>
-          </p:nvPr>
-        </p:nvSpPr>
-        <p:spPr/>
-        <p:txBody>
-          <a:bodyPr/>
-          <a:p>
-            <a:fld id="{A3072476-8289-436C-AE30-CF9662F825C0}" type="slidenum">
+            <p:ph type="sldNum" idx="2"/>
+          </p:nvPr>
+        </p:nvSpPr>
+        <p:spPr/>
+        <p:txBody>
+          <a:bodyPr/>
+          <a:p>
+            <a:fld id="{38A0A7B9-39AD-407C-8362-B7A368B5C71A}" type="slidenum">
               <a:t>&lt;#&gt;</a:t>
             </a:fld>
           </a:p>
@@ -1583,7 +1743,7 @@
             <a:spLocks noGrp="1"/>
           </p:cNvSpPr>
           <p:nvPr>
-            <p:ph type="dt" idx="1"/>
+            <p:ph type="dt" idx="3"/>
           </p:nvPr>
         </p:nvSpPr>
         <p:spPr/>
@@ -1621,7 +1781,7 @@
       </p:grpSpPr>
       <p:sp>
         <p:nvSpPr>
-          <p:cNvPr id="14" name="PlaceHolder 1"/>
+          <p:cNvPr id="12" name="PlaceHolder 1"/>
           <p:cNvSpPr>
             <a:spLocks noGrp="1"/>
           </p:cNvSpPr>
@@ -1632,7 +1792,7 @@
         <p:spPr>
           <a:xfrm>
             <a:off x="504000" y="226080"/>
-            <a:ext cx="9071640" cy="946440"/>
+            <a:ext cx="9072000" cy="946440"/>
           </a:xfrm>
           <a:prstGeom prst="rect">
             <a:avLst/>
@@ -1647,18 +1807,21 @@
             <a:noAutofit/>
           </a:bodyPr>
           <a:p>
-            <a:pPr algn="ctr">
+            <a:pPr indent="0" algn="ctr">
               <a:buNone/>
             </a:pPr>
             <a:endParaRPr b="0" lang="en-US" sz="4400" spc="-1" strike="noStrike">
-              <a:latin typeface="Arial"/>
-            </a:endParaRPr>
-          </a:p>
-        </p:txBody>
-      </p:sp>
-      <p:sp>
-        <p:nvSpPr>
-          <p:cNvPr id="15" name="PlaceHolder 2"/>
+              <a:solidFill>
+                <a:srgbClr val="000000"/>
+              </a:solidFill>
+              <a:latin typeface="Arial"/>
+            </a:endParaRPr>
+          </a:p>
+        </p:txBody>
+      </p:sp>
+      <p:sp>
+        <p:nvSpPr>
+          <p:cNvPr id="13" name="PlaceHolder 2"/>
           <p:cNvSpPr>
             <a:spLocks noGrp="1"/>
           </p:cNvSpPr>
@@ -1669,7 +1832,7 @@
         <p:spPr>
           <a:xfrm>
             <a:off x="504000" y="1326600"/>
-            <a:ext cx="4426920" cy="1568160"/>
+            <a:ext cx="4426920" cy="1568520"/>
           </a:xfrm>
           <a:prstGeom prst="rect">
             <a:avLst/>
@@ -1684,15 +1847,24 @@
             <a:normAutofit/>
           </a:bodyPr>
           <a:p>
+            <a:pPr indent="0">
+              <a:spcBef>
+                <a:spcPts val="1417"/>
+              </a:spcBef>
+              <a:buNone/>
+            </a:pPr>
             <a:endParaRPr b="0" lang="en-US" sz="3200" spc="-1" strike="noStrike">
-              <a:latin typeface="Arial"/>
-            </a:endParaRPr>
-          </a:p>
-        </p:txBody>
-      </p:sp>
-      <p:sp>
-        <p:nvSpPr>
-          <p:cNvPr id="16" name="PlaceHolder 3"/>
+              <a:solidFill>
+                <a:srgbClr val="000000"/>
+              </a:solidFill>
+              <a:latin typeface="Arial"/>
+            </a:endParaRPr>
+          </a:p>
+        </p:txBody>
+      </p:sp>
+      <p:sp>
+        <p:nvSpPr>
+          <p:cNvPr id="14" name="PlaceHolder 3"/>
           <p:cNvSpPr>
             <a:spLocks noGrp="1"/>
           </p:cNvSpPr>
@@ -1703,7 +1875,7 @@
         <p:spPr>
           <a:xfrm>
             <a:off x="5152680" y="1326600"/>
-            <a:ext cx="4426920" cy="3288240"/>
+            <a:ext cx="4426920" cy="3288600"/>
           </a:xfrm>
           <a:prstGeom prst="rect">
             <a:avLst/>
@@ -1718,15 +1890,24 @@
             <a:normAutofit/>
           </a:bodyPr>
           <a:p>
+            <a:pPr indent="0">
+              <a:spcBef>
+                <a:spcPts val="1417"/>
+              </a:spcBef>
+              <a:buNone/>
+            </a:pPr>
             <a:endParaRPr b="0" lang="en-US" sz="3200" spc="-1" strike="noStrike">
-              <a:latin typeface="Arial"/>
-            </a:endParaRPr>
-          </a:p>
-        </p:txBody>
-      </p:sp>
-      <p:sp>
-        <p:nvSpPr>
-          <p:cNvPr id="17" name="PlaceHolder 4"/>
+              <a:solidFill>
+                <a:srgbClr val="000000"/>
+              </a:solidFill>
+              <a:latin typeface="Arial"/>
+            </a:endParaRPr>
+          </a:p>
+        </p:txBody>
+      </p:sp>
+      <p:sp>
+        <p:nvSpPr>
+          <p:cNvPr id="15" name="PlaceHolder 4"/>
           <p:cNvSpPr>
             <a:spLocks noGrp="1"/>
           </p:cNvSpPr>
@@ -1736,8 +1917,8 @@
         </p:nvSpPr>
         <p:spPr>
           <a:xfrm>
-            <a:off x="504000" y="3044160"/>
-            <a:ext cx="4426920" cy="1568160"/>
+            <a:off x="504000" y="3044520"/>
+            <a:ext cx="4426920" cy="1568520"/>
           </a:xfrm>
           <a:prstGeom prst="rect">
             <a:avLst/>
@@ -1752,7 +1933,16 @@
             <a:normAutofit/>
           </a:bodyPr>
           <a:p>
+            <a:pPr indent="0">
+              <a:spcBef>
+                <a:spcPts val="1417"/>
+              </a:spcBef>
+              <a:buNone/>
+            </a:pPr>
             <a:endParaRPr b="0" lang="en-US" sz="3200" spc="-1" strike="noStrike">
+              <a:solidFill>
+                <a:srgbClr val="000000"/>
+              </a:solidFill>
               <a:latin typeface="Arial"/>
             </a:endParaRPr>
           </a:p>
@@ -1765,7 +1955,7 @@
             <a:spLocks noGrp="1"/>
           </p:cNvSpPr>
           <p:nvPr>
-            <p:ph type="ftr" idx="2"/>
+            <p:ph type="ftr" idx="1"/>
           </p:nvPr>
         </p:nvSpPr>
         <p:spPr/>
@@ -1785,14 +1975,14 @@
             <a:spLocks noGrp="1"/>
           </p:cNvSpPr>
           <p:nvPr>
-            <p:ph type="sldNum" idx="3"/>
-          </p:nvPr>
-        </p:nvSpPr>
-        <p:spPr/>
-        <p:txBody>
-          <a:bodyPr/>
-          <a:p>
-            <a:fld id="{F17624DA-FF90-4BD5-9C66-F60F5103BA22}" type="slidenum">
+            <p:ph type="sldNum" idx="2"/>
+          </p:nvPr>
+        </p:nvSpPr>
+        <p:spPr/>
+        <p:txBody>
+          <a:bodyPr/>
+          <a:p>
+            <a:fld id="{E8C5E0B1-2294-484A-82E3-D74D6B5C2FB5}" type="slidenum">
               <a:t>&lt;#&gt;</a:t>
             </a:fld>
           </a:p>
@@ -1805,7 +1995,7 @@
             <a:spLocks noGrp="1"/>
           </p:cNvSpPr>
           <p:nvPr>
-            <p:ph type="dt" idx="1"/>
+            <p:ph type="dt" idx="3"/>
           </p:nvPr>
         </p:nvSpPr>
         <p:spPr/>
@@ -1843,7 +2033,7 @@
       </p:grpSpPr>
       <p:sp>
         <p:nvSpPr>
-          <p:cNvPr id="18" name="PlaceHolder 1"/>
+          <p:cNvPr id="16" name="PlaceHolder 1"/>
           <p:cNvSpPr>
             <a:spLocks noGrp="1"/>
           </p:cNvSpPr>
@@ -1854,7 +2044,7 @@
         <p:spPr>
           <a:xfrm>
             <a:off x="504000" y="226080"/>
-            <a:ext cx="9071640" cy="946440"/>
+            <a:ext cx="9072000" cy="946440"/>
           </a:xfrm>
           <a:prstGeom prst="rect">
             <a:avLst/>
@@ -1869,18 +2059,21 @@
             <a:noAutofit/>
           </a:bodyPr>
           <a:p>
-            <a:pPr algn="ctr">
+            <a:pPr indent="0" algn="ctr">
               <a:buNone/>
             </a:pPr>
             <a:endParaRPr b="0" lang="en-US" sz="4400" spc="-1" strike="noStrike">
-              <a:latin typeface="Arial"/>
-            </a:endParaRPr>
-          </a:p>
-        </p:txBody>
-      </p:sp>
-      <p:sp>
-        <p:nvSpPr>
-          <p:cNvPr id="19" name="PlaceHolder 2"/>
+              <a:solidFill>
+                <a:srgbClr val="000000"/>
+              </a:solidFill>
+              <a:latin typeface="Arial"/>
+            </a:endParaRPr>
+          </a:p>
+        </p:txBody>
+      </p:sp>
+      <p:sp>
+        <p:nvSpPr>
+          <p:cNvPr id="17" name="PlaceHolder 2"/>
           <p:cNvSpPr>
             <a:spLocks noGrp="1"/>
           </p:cNvSpPr>
@@ -1891,7 +2084,7 @@
         <p:spPr>
           <a:xfrm>
             <a:off x="504000" y="1326600"/>
-            <a:ext cx="4426920" cy="3288240"/>
+            <a:ext cx="4426920" cy="3288600"/>
           </a:xfrm>
           <a:prstGeom prst="rect">
             <a:avLst/>
@@ -1906,15 +2099,24 @@
             <a:normAutofit/>
           </a:bodyPr>
           <a:p>
+            <a:pPr indent="0">
+              <a:spcBef>
+                <a:spcPts val="1417"/>
+              </a:spcBef>
+              <a:buNone/>
+            </a:pPr>
             <a:endParaRPr b="0" lang="en-US" sz="3200" spc="-1" strike="noStrike">
-              <a:latin typeface="Arial"/>
-            </a:endParaRPr>
-          </a:p>
-        </p:txBody>
-      </p:sp>
-      <p:sp>
-        <p:nvSpPr>
-          <p:cNvPr id="20" name="PlaceHolder 3"/>
+              <a:solidFill>
+                <a:srgbClr val="000000"/>
+              </a:solidFill>
+              <a:latin typeface="Arial"/>
+            </a:endParaRPr>
+          </a:p>
+        </p:txBody>
+      </p:sp>
+      <p:sp>
+        <p:nvSpPr>
+          <p:cNvPr id="18" name="PlaceHolder 3"/>
           <p:cNvSpPr>
             <a:spLocks noGrp="1"/>
           </p:cNvSpPr>
@@ -1925,7 +2127,7 @@
         <p:spPr>
           <a:xfrm>
             <a:off x="5152680" y="1326600"/>
-            <a:ext cx="4426920" cy="1568160"/>
+            <a:ext cx="4426920" cy="1568520"/>
           </a:xfrm>
           <a:prstGeom prst="rect">
             <a:avLst/>
@@ -1940,15 +2142,24 @@
             <a:normAutofit/>
           </a:bodyPr>
           <a:p>
+            <a:pPr indent="0">
+              <a:spcBef>
+                <a:spcPts val="1417"/>
+              </a:spcBef>
+              <a:buNone/>
+            </a:pPr>
             <a:endParaRPr b="0" lang="en-US" sz="3200" spc="-1" strike="noStrike">
-              <a:latin typeface="Arial"/>
-            </a:endParaRPr>
-          </a:p>
-        </p:txBody>
-      </p:sp>
-      <p:sp>
-        <p:nvSpPr>
-          <p:cNvPr id="21" name="PlaceHolder 4"/>
+              <a:solidFill>
+                <a:srgbClr val="000000"/>
+              </a:solidFill>
+              <a:latin typeface="Arial"/>
+            </a:endParaRPr>
+          </a:p>
+        </p:txBody>
+      </p:sp>
+      <p:sp>
+        <p:nvSpPr>
+          <p:cNvPr id="19" name="PlaceHolder 4"/>
           <p:cNvSpPr>
             <a:spLocks noGrp="1"/>
           </p:cNvSpPr>
@@ -1958,8 +2169,8 @@
         </p:nvSpPr>
         <p:spPr>
           <a:xfrm>
-            <a:off x="5152680" y="3044160"/>
-            <a:ext cx="4426920" cy="1568160"/>
+            <a:off x="5152680" y="3044520"/>
+            <a:ext cx="4426920" cy="1568520"/>
           </a:xfrm>
           <a:prstGeom prst="rect">
             <a:avLst/>
@@ -1974,7 +2185,16 @@
             <a:normAutofit/>
           </a:bodyPr>
           <a:p>
+            <a:pPr indent="0">
+              <a:spcBef>
+                <a:spcPts val="1417"/>
+              </a:spcBef>
+              <a:buNone/>
+            </a:pPr>
             <a:endParaRPr b="0" lang="en-US" sz="3200" spc="-1" strike="noStrike">
+              <a:solidFill>
+                <a:srgbClr val="000000"/>
+              </a:solidFill>
               <a:latin typeface="Arial"/>
             </a:endParaRPr>
           </a:p>
@@ -1987,7 +2207,7 @@
             <a:spLocks noGrp="1"/>
           </p:cNvSpPr>
           <p:nvPr>
-            <p:ph type="ftr" idx="2"/>
+            <p:ph type="ftr" idx="1"/>
           </p:nvPr>
         </p:nvSpPr>
         <p:spPr/>
@@ -2007,14 +2227,14 @@
             <a:spLocks noGrp="1"/>
           </p:cNvSpPr>
           <p:nvPr>
-            <p:ph type="sldNum" idx="3"/>
-          </p:nvPr>
-        </p:nvSpPr>
-        <p:spPr/>
-        <p:txBody>
-          <a:bodyPr/>
-          <a:p>
-            <a:fld id="{DCD3408C-54EA-4F7F-931D-ECBE32174930}" type="slidenum">
+            <p:ph type="sldNum" idx="2"/>
+          </p:nvPr>
+        </p:nvSpPr>
+        <p:spPr/>
+        <p:txBody>
+          <a:bodyPr/>
+          <a:p>
+            <a:fld id="{1D560C90-C10C-4351-BCC9-5EB2C7735C7C}" type="slidenum">
               <a:t>&lt;#&gt;</a:t>
             </a:fld>
           </a:p>
@@ -2027,7 +2247,7 @@
             <a:spLocks noGrp="1"/>
           </p:cNvSpPr>
           <p:nvPr>
-            <p:ph type="dt" idx="1"/>
+            <p:ph type="dt" idx="3"/>
           </p:nvPr>
         </p:nvSpPr>
         <p:spPr/>
@@ -2065,7 +2285,7 @@
       </p:grpSpPr>
       <p:sp>
         <p:nvSpPr>
-          <p:cNvPr id="22" name="PlaceHolder 1"/>
+          <p:cNvPr id="20" name="PlaceHolder 1"/>
           <p:cNvSpPr>
             <a:spLocks noGrp="1"/>
           </p:cNvSpPr>
@@ -2076,7 +2296,7 @@
         <p:spPr>
           <a:xfrm>
             <a:off x="504000" y="226080"/>
-            <a:ext cx="9071640" cy="946440"/>
+            <a:ext cx="9072000" cy="946440"/>
           </a:xfrm>
           <a:prstGeom prst="rect">
             <a:avLst/>
@@ -2091,18 +2311,21 @@
             <a:noAutofit/>
           </a:bodyPr>
           <a:p>
-            <a:pPr algn="ctr">
+            <a:pPr indent="0" algn="ctr">
               <a:buNone/>
             </a:pPr>
             <a:endParaRPr b="0" lang="en-US" sz="4400" spc="-1" strike="noStrike">
-              <a:latin typeface="Arial"/>
-            </a:endParaRPr>
-          </a:p>
-        </p:txBody>
-      </p:sp>
-      <p:sp>
-        <p:nvSpPr>
-          <p:cNvPr id="23" name="PlaceHolder 2"/>
+              <a:solidFill>
+                <a:srgbClr val="000000"/>
+              </a:solidFill>
+              <a:latin typeface="Arial"/>
+            </a:endParaRPr>
+          </a:p>
+        </p:txBody>
+      </p:sp>
+      <p:sp>
+        <p:nvSpPr>
+          <p:cNvPr id="21" name="PlaceHolder 2"/>
           <p:cNvSpPr>
             <a:spLocks noGrp="1"/>
           </p:cNvSpPr>
@@ -2113,7 +2336,7 @@
         <p:spPr>
           <a:xfrm>
             <a:off x="504000" y="1326600"/>
-            <a:ext cx="4426920" cy="1568160"/>
+            <a:ext cx="4426920" cy="1568520"/>
           </a:xfrm>
           <a:prstGeom prst="rect">
             <a:avLst/>
@@ -2128,15 +2351,24 @@
             <a:normAutofit/>
           </a:bodyPr>
           <a:p>
+            <a:pPr indent="0">
+              <a:spcBef>
+                <a:spcPts val="1417"/>
+              </a:spcBef>
+              <a:buNone/>
+            </a:pPr>
             <a:endParaRPr b="0" lang="en-US" sz="3200" spc="-1" strike="noStrike">
-              <a:latin typeface="Arial"/>
-            </a:endParaRPr>
-          </a:p>
-        </p:txBody>
-      </p:sp>
-      <p:sp>
-        <p:nvSpPr>
-          <p:cNvPr id="24" name="PlaceHolder 3"/>
+              <a:solidFill>
+                <a:srgbClr val="000000"/>
+              </a:solidFill>
+              <a:latin typeface="Arial"/>
+            </a:endParaRPr>
+          </a:p>
+        </p:txBody>
+      </p:sp>
+      <p:sp>
+        <p:nvSpPr>
+          <p:cNvPr id="22" name="PlaceHolder 3"/>
           <p:cNvSpPr>
             <a:spLocks noGrp="1"/>
           </p:cNvSpPr>
@@ -2147,7 +2379,7 @@
         <p:spPr>
           <a:xfrm>
             <a:off x="5152680" y="1326600"/>
-            <a:ext cx="4426920" cy="1568160"/>
+            <a:ext cx="4426920" cy="1568520"/>
           </a:xfrm>
           <a:prstGeom prst="rect">
             <a:avLst/>
@@ -2162,15 +2394,24 @@
             <a:normAutofit/>
           </a:bodyPr>
           <a:p>
+            <a:pPr indent="0">
+              <a:spcBef>
+                <a:spcPts val="1417"/>
+              </a:spcBef>
+              <a:buNone/>
+            </a:pPr>
             <a:endParaRPr b="0" lang="en-US" sz="3200" spc="-1" strike="noStrike">
-              <a:latin typeface="Arial"/>
-            </a:endParaRPr>
-          </a:p>
-        </p:txBody>
-      </p:sp>
-      <p:sp>
-        <p:nvSpPr>
-          <p:cNvPr id="25" name="PlaceHolder 4"/>
+              <a:solidFill>
+                <a:srgbClr val="000000"/>
+              </a:solidFill>
+              <a:latin typeface="Arial"/>
+            </a:endParaRPr>
+          </a:p>
+        </p:txBody>
+      </p:sp>
+      <p:sp>
+        <p:nvSpPr>
+          <p:cNvPr id="23" name="PlaceHolder 4"/>
           <p:cNvSpPr>
             <a:spLocks noGrp="1"/>
           </p:cNvSpPr>
@@ -2180,8 +2421,8 @@
         </p:nvSpPr>
         <p:spPr>
           <a:xfrm>
-            <a:off x="504000" y="3044160"/>
-            <a:ext cx="9071640" cy="1568160"/>
+            <a:off x="504000" y="3044520"/>
+            <a:ext cx="9072000" cy="1568520"/>
           </a:xfrm>
           <a:prstGeom prst="rect">
             <a:avLst/>
@@ -2196,7 +2437,16 @@
             <a:normAutofit/>
           </a:bodyPr>
           <a:p>
+            <a:pPr indent="0">
+              <a:spcBef>
+                <a:spcPts val="1417"/>
+              </a:spcBef>
+              <a:buNone/>
+            </a:pPr>
             <a:endParaRPr b="0" lang="en-US" sz="3200" spc="-1" strike="noStrike">
+              <a:solidFill>
+                <a:srgbClr val="000000"/>
+              </a:solidFill>
               <a:latin typeface="Arial"/>
             </a:endParaRPr>
           </a:p>
@@ -2209,7 +2459,7 @@
             <a:spLocks noGrp="1"/>
           </p:cNvSpPr>
           <p:nvPr>
-            <p:ph type="ftr" idx="2"/>
+            <p:ph type="ftr" idx="1"/>
           </p:nvPr>
         </p:nvSpPr>
         <p:spPr/>
@@ -2229,14 +2479,14 @@
             <a:spLocks noGrp="1"/>
           </p:cNvSpPr>
           <p:nvPr>
-            <p:ph type="sldNum" idx="3"/>
-          </p:nvPr>
-        </p:nvSpPr>
-        <p:spPr/>
-        <p:txBody>
-          <a:bodyPr/>
-          <a:p>
-            <a:fld id="{D4500983-07D0-4BC9-8AD0-76EBCF4174DE}" type="slidenum">
+            <p:ph type="sldNum" idx="2"/>
+          </p:nvPr>
+        </p:nvSpPr>
+        <p:spPr/>
+        <p:txBody>
+          <a:bodyPr/>
+          <a:p>
+            <a:fld id="{D9F4CF99-1AB6-42FA-93D3-49F95A4DFBF6}" type="slidenum">
               <a:t>&lt;#&gt;</a:t>
             </a:fld>
           </a:p>
@@ -2249,7 +2499,7 @@
             <a:spLocks noGrp="1"/>
           </p:cNvSpPr>
           <p:nvPr>
-            <p:ph type="dt" idx="1"/>
+            <p:ph type="dt" idx="3"/>
           </p:nvPr>
         </p:nvSpPr>
         <p:spPr/>
@@ -2292,239 +2542,13 @@
             <a:spLocks noGrp="1"/>
           </p:cNvSpPr>
           <p:nvPr>
-            <p:ph type="title"/>
-          </p:nvPr>
-        </p:nvSpPr>
-        <p:spPr>
-          <a:xfrm>
-            <a:off x="504000" y="226080"/>
-            <a:ext cx="9071640" cy="946440"/>
-          </a:xfrm>
-          <a:prstGeom prst="rect">
-            <a:avLst/>
-          </a:prstGeom>
-          <a:noFill/>
-          <a:ln w="0">
-            <a:noFill/>
-          </a:ln>
-        </p:spPr>
-        <p:txBody>
-          <a:bodyPr lIns="0" rIns="0" tIns="0" bIns="0" anchor="ctr">
-            <a:noAutofit/>
-          </a:bodyPr>
-          <a:p>
-            <a:pPr algn="ctr">
-              <a:buNone/>
-            </a:pPr>
-            <a:r>
-              <a:rPr b="0" lang="en-US" sz="4400" spc="-1" strike="noStrike">
-                <a:latin typeface="Arial"/>
-              </a:rPr>
-              <a:t>Click to edit the title text format</a:t>
-            </a:r>
-            <a:endParaRPr b="0" lang="en-US" sz="4400" spc="-1" strike="noStrike">
-              <a:latin typeface="Arial"/>
-            </a:endParaRPr>
-          </a:p>
-        </p:txBody>
-      </p:sp>
-      <p:sp>
-        <p:nvSpPr>
-          <p:cNvPr id="1" name="PlaceHolder 2"/>
-          <p:cNvSpPr>
-            <a:spLocks noGrp="1"/>
-          </p:cNvSpPr>
-          <p:nvPr>
-            <p:ph type="body"/>
-          </p:nvPr>
-        </p:nvSpPr>
-        <p:spPr>
-          <a:xfrm>
-            <a:off x="504000" y="1326600"/>
-            <a:ext cx="9071640" cy="3288240"/>
-          </a:xfrm>
-          <a:prstGeom prst="rect">
-            <a:avLst/>
-          </a:prstGeom>
-          <a:noFill/>
-          <a:ln w="0">
-            <a:noFill/>
-          </a:ln>
-        </p:spPr>
-        <p:txBody>
-          <a:bodyPr lIns="0" rIns="0" tIns="0" bIns="0" anchor="t">
-            <a:normAutofit/>
-          </a:bodyPr>
-          <a:p>
-            <a:pPr marL="432000" indent="-324000">
-              <a:spcBef>
-                <a:spcPts val="1417"/>
-              </a:spcBef>
-              <a:buClr>
-                <a:srgbClr val="000000"/>
-              </a:buClr>
-              <a:buSzPct val="45000"/>
-              <a:buFont typeface="Wingdings" charset="2"/>
-              <a:buChar char=""/>
-            </a:pPr>
-            <a:r>
-              <a:rPr b="0" lang="en-US" sz="3200" spc="-1" strike="noStrike">
-                <a:latin typeface="Arial"/>
-              </a:rPr>
-              <a:t>Click to edit the outline text format</a:t>
-            </a:r>
-            <a:endParaRPr b="0" lang="en-US" sz="3200" spc="-1" strike="noStrike">
-              <a:latin typeface="Arial"/>
-            </a:endParaRPr>
-          </a:p>
-          <a:p>
-            <a:pPr lvl="1" marL="864000" indent="-324000">
-              <a:spcBef>
-                <a:spcPts val="1134"/>
-              </a:spcBef>
-              <a:buClr>
-                <a:srgbClr val="000000"/>
-              </a:buClr>
-              <a:buSzPct val="75000"/>
-              <a:buFont typeface="Symbol" charset="2"/>
-              <a:buChar char=""/>
-            </a:pPr>
-            <a:r>
-              <a:rPr b="0" lang="en-US" sz="2800" spc="-1" strike="noStrike">
-                <a:latin typeface="Arial"/>
-              </a:rPr>
-              <a:t>Second Outline Level</a:t>
-            </a:r>
-            <a:endParaRPr b="0" lang="en-US" sz="2800" spc="-1" strike="noStrike">
-              <a:latin typeface="Arial"/>
-            </a:endParaRPr>
-          </a:p>
-          <a:p>
-            <a:pPr lvl="2" marL="1296000" indent="-288000">
-              <a:spcBef>
-                <a:spcPts val="850"/>
-              </a:spcBef>
-              <a:buClr>
-                <a:srgbClr val="000000"/>
-              </a:buClr>
-              <a:buSzPct val="45000"/>
-              <a:buFont typeface="Wingdings" charset="2"/>
-              <a:buChar char=""/>
-            </a:pPr>
-            <a:r>
-              <a:rPr b="0" lang="en-US" sz="2400" spc="-1" strike="noStrike">
-                <a:latin typeface="Arial"/>
-              </a:rPr>
-              <a:t>Third Outline Level</a:t>
-            </a:r>
-            <a:endParaRPr b="0" lang="en-US" sz="2400" spc="-1" strike="noStrike">
-              <a:latin typeface="Arial"/>
-            </a:endParaRPr>
-          </a:p>
-          <a:p>
-            <a:pPr lvl="3" marL="1728000" indent="-216000">
-              <a:spcBef>
-                <a:spcPts val="567"/>
-              </a:spcBef>
-              <a:buClr>
-                <a:srgbClr val="000000"/>
-              </a:buClr>
-              <a:buSzPct val="75000"/>
-              <a:buFont typeface="Symbol" charset="2"/>
-              <a:buChar char=""/>
-            </a:pPr>
-            <a:r>
-              <a:rPr b="0" lang="en-US" sz="2000" spc="-1" strike="noStrike">
-                <a:latin typeface="Arial"/>
-              </a:rPr>
-              <a:t>Fourth Outline Level</a:t>
-            </a:r>
-            <a:endParaRPr b="0" lang="en-US" sz="2000" spc="-1" strike="noStrike">
-              <a:latin typeface="Arial"/>
-            </a:endParaRPr>
-          </a:p>
-          <a:p>
-            <a:pPr lvl="4" marL="2160000" indent="-216000">
-              <a:spcBef>
-                <a:spcPts val="283"/>
-              </a:spcBef>
-              <a:buClr>
-                <a:srgbClr val="000000"/>
-              </a:buClr>
-              <a:buSzPct val="45000"/>
-              <a:buFont typeface="Wingdings" charset="2"/>
-              <a:buChar char=""/>
-            </a:pPr>
-            <a:r>
-              <a:rPr b="0" lang="en-US" sz="2000" spc="-1" strike="noStrike">
-                <a:latin typeface="Arial"/>
-              </a:rPr>
-              <a:t>Fifth Outline Level</a:t>
-            </a:r>
-            <a:endParaRPr b="0" lang="en-US" sz="2000" spc="-1" strike="noStrike">
-              <a:latin typeface="Arial"/>
-            </a:endParaRPr>
-          </a:p>
-          <a:p>
-            <a:pPr lvl="5" marL="2592000" indent="-216000">
-              <a:spcBef>
-                <a:spcPts val="283"/>
-              </a:spcBef>
-              <a:buClr>
-                <a:srgbClr val="000000"/>
-              </a:buClr>
-              <a:buSzPct val="45000"/>
-              <a:buFont typeface="Wingdings" charset="2"/>
-              <a:buChar char=""/>
-            </a:pPr>
-            <a:r>
-              <a:rPr b="0" lang="en-US" sz="2000" spc="-1" strike="noStrike">
-                <a:latin typeface="Arial"/>
-              </a:rPr>
-              <a:t>Sixth Outline Level</a:t>
-            </a:r>
-            <a:endParaRPr b="0" lang="en-US" sz="2000" spc="-1" strike="noStrike">
-              <a:latin typeface="Arial"/>
-            </a:endParaRPr>
-          </a:p>
-          <a:p>
-            <a:pPr lvl="6" marL="3024000" indent="-216000">
-              <a:spcBef>
-                <a:spcPts val="283"/>
-              </a:spcBef>
-              <a:buClr>
-                <a:srgbClr val="000000"/>
-              </a:buClr>
-              <a:buSzPct val="45000"/>
-              <a:buFont typeface="Wingdings" charset="2"/>
-              <a:buChar char=""/>
-            </a:pPr>
-            <a:r>
-              <a:rPr b="0" lang="en-US" sz="2000" spc="-1" strike="noStrike">
-                <a:latin typeface="Arial"/>
-              </a:rPr>
-              <a:t>Seventh Outline Level</a:t>
-            </a:r>
-            <a:endParaRPr b="0" lang="en-US" sz="2000" spc="-1" strike="noStrike">
-              <a:latin typeface="Arial"/>
-            </a:endParaRPr>
-          </a:p>
-        </p:txBody>
-      </p:sp>
-      <p:sp>
-        <p:nvSpPr>
-          <p:cNvPr id="2" name="PlaceHolder 3"/>
-          <p:cNvSpPr>
-            <a:spLocks noGrp="1"/>
-          </p:cNvSpPr>
-          <p:nvPr>
-            <p:ph type="dt" idx="1"/>
-          </p:nvPr>
-        </p:nvSpPr>
-        <p:spPr>
-          <a:xfrm>
-            <a:off x="504000" y="5165280"/>
-            <a:ext cx="2348280" cy="390600"/>
+            <p:ph type="ftr" idx="1"/>
+          </p:nvPr>
+        </p:nvSpPr>
+        <p:spPr>
+          <a:xfrm>
+            <a:off x="3447360" y="5165280"/>
+            <a:ext cx="3194640" cy="390240"/>
           </a:xfrm>
           <a:prstGeom prst="rect">
             <a:avLst/>
@@ -2539,20 +2563,39 @@
             <a:noAutofit/>
           </a:bodyPr>
           <a:lstStyle>
-            <a:lvl1pPr>
+            <a:lvl1pPr indent="0" algn="ctr">
+              <a:lnSpc>
+                <a:spcPct val="100000"/>
+              </a:lnSpc>
+              <a:buNone/>
               <a:defRPr b="0" lang="en-US" sz="1400" spc="-1" strike="noStrike">
+                <a:solidFill>
+                  <a:srgbClr val="000000"/>
+                </a:solidFill>
                 <a:latin typeface="Times New Roman"/>
               </a:defRPr>
             </a:lvl1pPr>
           </a:lstStyle>
           <a:p>
+            <a:pPr indent="0" algn="ctr">
+              <a:lnSpc>
+                <a:spcPct val="100000"/>
+              </a:lnSpc>
+              <a:buNone/>
+            </a:pPr>
             <a:r>
               <a:rPr b="0" lang="en-US" sz="1400" spc="-1" strike="noStrike">
+                <a:solidFill>
+                  <a:srgbClr val="000000"/>
+                </a:solidFill>
                 <a:latin typeface="Times New Roman"/>
               </a:rPr>
-              <a:t>&lt;date/time&gt;</a:t>
+              <a:t> </a:t>
             </a:r>
             <a:endParaRPr b="0" lang="en-US" sz="1400" spc="-1" strike="noStrike">
+              <a:solidFill>
+                <a:srgbClr val="000000"/>
+              </a:solidFill>
               <a:latin typeface="Times New Roman"/>
             </a:endParaRPr>
           </a:p>
@@ -2560,18 +2603,18 @@
       </p:sp>
       <p:sp>
         <p:nvSpPr>
-          <p:cNvPr id="3" name="PlaceHolder 4"/>
-          <p:cNvSpPr>
-            <a:spLocks noGrp="1"/>
-          </p:cNvSpPr>
-          <p:nvPr>
-            <p:ph type="ftr" idx="2"/>
-          </p:nvPr>
-        </p:nvSpPr>
-        <p:spPr>
-          <a:xfrm>
-            <a:off x="3447360" y="5165280"/>
-            <a:ext cx="3195000" cy="390600"/>
+          <p:cNvPr id="1" name="PlaceHolder 2"/>
+          <p:cNvSpPr>
+            <a:spLocks noGrp="1"/>
+          </p:cNvSpPr>
+          <p:nvPr>
+            <p:ph type="sldNum" idx="2"/>
+          </p:nvPr>
+        </p:nvSpPr>
+        <p:spPr>
+          <a:xfrm>
+            <a:off x="7227360" y="5165280"/>
+            <a:ext cx="2347920" cy="390240"/>
           </a:xfrm>
           <a:prstGeom prst="rect">
             <a:avLst/>
@@ -2586,24 +2629,39 @@
             <a:noAutofit/>
           </a:bodyPr>
           <a:lstStyle>
-            <a:lvl1pPr algn="ctr">
+            <a:lvl1pPr indent="0" algn="r">
+              <a:lnSpc>
+                <a:spcPct val="100000"/>
+              </a:lnSpc>
               <a:buNone/>
               <a:defRPr b="0" lang="en-US" sz="1400" spc="-1" strike="noStrike">
+                <a:solidFill>
+                  <a:srgbClr val="000000"/>
+                </a:solidFill>
                 <a:latin typeface="Times New Roman"/>
               </a:defRPr>
             </a:lvl1pPr>
           </a:lstStyle>
           <a:p>
-            <a:pPr algn="ctr">
-              <a:buNone/>
-            </a:pPr>
-            <a:r>
+            <a:pPr indent="0" algn="r">
+              <a:lnSpc>
+                <a:spcPct val="100000"/>
+              </a:lnSpc>
+              <a:buNone/>
+            </a:pPr>
+            <a:fld id="{FD347139-9290-42F7-8794-1380DAD24F61}" type="slidenum">
               <a:rPr b="0" lang="en-US" sz="1400" spc="-1" strike="noStrike">
+                <a:solidFill>
+                  <a:srgbClr val="000000"/>
+                </a:solidFill>
                 <a:latin typeface="Times New Roman"/>
               </a:rPr>
-              <a:t>&lt;footer&gt;</a:t>
-            </a:r>
+              <a:t>1</a:t>
+            </a:fld>
             <a:endParaRPr b="0" lang="en-US" sz="1400" spc="-1" strike="noStrike">
+              <a:solidFill>
+                <a:srgbClr val="000000"/>
+              </a:solidFill>
               <a:latin typeface="Times New Roman"/>
             </a:endParaRPr>
           </a:p>
@@ -2611,18 +2669,18 @@
       </p:sp>
       <p:sp>
         <p:nvSpPr>
-          <p:cNvPr id="4" name="PlaceHolder 5"/>
-          <p:cNvSpPr>
-            <a:spLocks noGrp="1"/>
-          </p:cNvSpPr>
-          <p:nvPr>
-            <p:ph type="sldNum" idx="3"/>
-          </p:nvPr>
-        </p:nvSpPr>
-        <p:spPr>
-          <a:xfrm>
-            <a:off x="7227360" y="5165280"/>
-            <a:ext cx="2348280" cy="390600"/>
+          <p:cNvPr id="2" name="PlaceHolder 3"/>
+          <p:cNvSpPr>
+            <a:spLocks noGrp="1"/>
+          </p:cNvSpPr>
+          <p:nvPr>
+            <p:ph type="dt" idx="3"/>
+          </p:nvPr>
+        </p:nvSpPr>
+        <p:spPr>
+          <a:xfrm>
+            <a:off x="504000" y="5165280"/>
+            <a:ext cx="2347920" cy="390240"/>
           </a:xfrm>
           <a:prstGeom prst="rect">
             <a:avLst/>
@@ -2637,24 +2695,33 @@
             <a:noAutofit/>
           </a:bodyPr>
           <a:lstStyle>
-            <a:lvl1pPr algn="r">
+            <a:lvl1pPr indent="0">
               <a:buNone/>
               <a:defRPr b="0" lang="en-US" sz="1400" spc="-1" strike="noStrike">
+                <a:solidFill>
+                  <a:srgbClr val="000000"/>
+                </a:solidFill>
                 <a:latin typeface="Times New Roman"/>
               </a:defRPr>
             </a:lvl1pPr>
           </a:lstStyle>
           <a:p>
-            <a:pPr algn="r">
-              <a:buNone/>
-            </a:pPr>
-            <a:fld id="{CEC6C171-C0F7-46E6-8A7F-113F46686E1F}" type="slidenum">
+            <a:pPr indent="0">
+              <a:buNone/>
+            </a:pPr>
+            <a:r>
               <a:rPr b="0" lang="en-US" sz="1400" spc="-1" strike="noStrike">
+                <a:solidFill>
+                  <a:srgbClr val="000000"/>
+                </a:solidFill>
                 <a:latin typeface="Times New Roman"/>
               </a:rPr>
-              <a:t>&lt;number&gt;</a:t>
-            </a:fld>
+              <a:t> </a:t>
+            </a:r>
             <a:endParaRPr b="0" lang="en-US" sz="1400" spc="-1" strike="noStrike">
+              <a:solidFill>
+                <a:srgbClr val="000000"/>
+              </a:solidFill>
               <a:latin typeface="Times New Roman"/>
             </a:endParaRPr>
           </a:p>
@@ -2699,7 +2766,7 @@
       </p:grpSpPr>
       <p:pic>
         <p:nvPicPr>
-          <p:cNvPr id="41" name="" descr=""/>
+          <p:cNvPr id="39" name="" descr=""/>
           <p:cNvPicPr/>
           <p:nvPr/>
         </p:nvPicPr>
@@ -2710,7 +2777,7 @@
         <p:spPr>
           <a:xfrm>
             <a:off x="1025640" y="-4680"/>
-            <a:ext cx="8028000" cy="5669640"/>
+            <a:ext cx="8027640" cy="5669280"/>
           </a:xfrm>
           <a:prstGeom prst="rect">
             <a:avLst/>
@@ -2720,6 +2787,210 @@
           </a:ln>
         </p:spPr>
       </p:pic>
+      <p:sp>
+        <p:nvSpPr>
+          <p:cNvPr id="40" name=""/>
+          <p:cNvSpPr/>
+          <p:nvPr/>
+        </p:nvSpPr>
+        <p:spPr>
+          <a:xfrm rot="66000">
+            <a:off x="8908560" y="3659400"/>
+            <a:ext cx="1142640" cy="672840"/>
+          </a:xfrm>
+          <a:prstGeom prst="rect">
+            <a:avLst/>
+          </a:prstGeom>
+          <a:solidFill>
+            <a:srgbClr val="ffffff"/>
+          </a:solidFill>
+          <a:ln w="0">
+            <a:solidFill>
+              <a:srgbClr val="254061"/>
+            </a:solidFill>
+          </a:ln>
+        </p:spPr>
+        <p:style>
+          <a:lnRef idx="0"/>
+          <a:fillRef idx="0"/>
+          <a:effectRef idx="0"/>
+          <a:fontRef idx="minor"/>
+        </p:style>
+        <p:txBody>
+          <a:bodyPr lIns="90000" rIns="90000" tIns="45000" bIns="45000" anchor="ctr">
+            <a:noAutofit/>
+          </a:bodyPr>
+          <a:p>
+            <a:pPr algn="ctr"/>
+            <a:r>
+              <a:rPr b="0" lang="en-US" sz="1400" spc="-1" strike="noStrike">
+                <a:solidFill>
+                  <a:srgbClr val="000000"/>
+                </a:solidFill>
+                <a:latin typeface="Arial"/>
+              </a:rPr>
+              <a:t>DONATION</a:t>
+            </a:r>
+            <a:endParaRPr b="0" lang="en-US" sz="1400" spc="-1" strike="noStrike">
+              <a:solidFill>
+                <a:srgbClr val="000000"/>
+              </a:solidFill>
+              <a:latin typeface="Arial"/>
+            </a:endParaRPr>
+          </a:p>
+        </p:txBody>
+      </p:sp>
+      <p:sp>
+        <p:nvSpPr>
+          <p:cNvPr id="41" name=""/>
+          <p:cNvSpPr txBox="1"/>
+          <p:nvPr/>
+        </p:nvSpPr>
+        <p:spPr>
+          <a:xfrm>
+            <a:off x="9486720" y="3370680"/>
+            <a:ext cx="457200" cy="288720"/>
+          </a:xfrm>
+          <a:prstGeom prst="rect">
+            <a:avLst/>
+          </a:prstGeom>
+          <a:noFill/>
+          <a:ln w="0">
+            <a:noFill/>
+          </a:ln>
+        </p:spPr>
+        <p:txBody>
+          <a:bodyPr lIns="90000" rIns="90000" tIns="45000" bIns="45000" anchor="t">
+            <a:noAutofit/>
+          </a:bodyPr>
+          <a:p>
+            <a:r>
+              <a:rPr b="0" lang="en-US" sz="1400" spc="-1" strike="noStrike">
+                <a:solidFill>
+                  <a:srgbClr val="000000"/>
+                </a:solidFill>
+                <a:latin typeface="Arial"/>
+              </a:rPr>
+              <a:t>M</a:t>
+            </a:r>
+            <a:endParaRPr b="0" lang="en-US" sz="1400" spc="-1" strike="noStrike">
+              <a:solidFill>
+                <a:srgbClr val="000000"/>
+              </a:solidFill>
+              <a:latin typeface="Arial"/>
+            </a:endParaRPr>
+          </a:p>
+        </p:txBody>
+      </p:sp>
+      <p:sp>
+        <p:nvSpPr>
+          <p:cNvPr id="42" name=""/>
+          <p:cNvSpPr txBox="1"/>
+          <p:nvPr/>
+        </p:nvSpPr>
+        <p:spPr>
+          <a:xfrm>
+            <a:off x="8159400" y="2829960"/>
+            <a:ext cx="457200" cy="288720"/>
+          </a:xfrm>
+          <a:prstGeom prst="rect">
+            <a:avLst/>
+          </a:prstGeom>
+          <a:noFill/>
+          <a:ln w="0">
+            <a:noFill/>
+          </a:ln>
+        </p:spPr>
+        <p:txBody>
+          <a:bodyPr lIns="90000" rIns="90000" tIns="45000" bIns="45000" anchor="t">
+            <a:noAutofit/>
+          </a:bodyPr>
+          <a:p>
+            <a:r>
+              <a:rPr b="0" lang="en-US" sz="1400" spc="-1" strike="noStrike">
+                <a:solidFill>
+                  <a:srgbClr val="000000"/>
+                </a:solidFill>
+                <a:latin typeface="Arial"/>
+              </a:rPr>
+              <a:t>1</a:t>
+            </a:r>
+            <a:endParaRPr b="0" lang="en-US" sz="1400" spc="-1" strike="noStrike">
+              <a:solidFill>
+                <a:srgbClr val="000000"/>
+              </a:solidFill>
+              <a:latin typeface="Arial"/>
+            </a:endParaRPr>
+          </a:p>
+        </p:txBody>
+      </p:sp>
+      <p:sp>
+        <p:nvSpPr>
+          <p:cNvPr id="43" name=""/>
+          <p:cNvSpPr/>
+          <p:nvPr/>
+        </p:nvSpPr>
+        <p:spPr>
+          <a:xfrm>
+            <a:off x="7916400" y="2995200"/>
+            <a:ext cx="228600" cy="228600"/>
+          </a:xfrm>
+          <a:prstGeom prst="rect">
+            <a:avLst/>
+          </a:prstGeom>
+          <a:solidFill>
+            <a:srgbClr val="ffffff"/>
+          </a:solidFill>
+          <a:ln w="0">
+            <a:solidFill>
+              <a:srgbClr val="254061"/>
+            </a:solidFill>
+          </a:ln>
+        </p:spPr>
+        <p:style>
+          <a:lnRef idx="0"/>
+          <a:fillRef idx="0"/>
+          <a:effectRef idx="0"/>
+          <a:fontRef idx="minor"/>
+        </p:style>
+        <p:txBody>
+          <a:bodyPr lIns="90000" rIns="90000" tIns="45000" bIns="45000" anchor="ctr">
+            <a:noAutofit/>
+          </a:bodyPr>
+          <a:p>
+            <a:endParaRPr b="0" lang="en-US" sz="1400" spc="-1" strike="noStrike">
+              <a:solidFill>
+                <a:srgbClr val="000000"/>
+              </a:solidFill>
+              <a:latin typeface="Arial"/>
+            </a:endParaRPr>
+          </a:p>
+        </p:txBody>
+      </p:sp>
+      <p:cxnSp>
+        <p:nvCxnSpPr>
+          <p:cNvPr id="44" name=""/>
+          <p:cNvCxnSpPr>
+            <a:stCxn id="43" idx="3"/>
+            <a:endCxn id="40" idx="0"/>
+          </p:cNvCxnSpPr>
+          <p:nvPr/>
+        </p:nvCxnSpPr>
+        <p:spPr>
+          <a:xfrm>
+            <a:off x="8145000" y="3109320"/>
+            <a:ext cx="1342080" cy="550440"/>
+          </a:xfrm>
+          <a:prstGeom prst="bentConnector2">
+            <a:avLst/>
+          </a:prstGeom>
+          <a:ln w="0">
+            <a:solidFill>
+              <a:srgbClr val="254061"/>
+            </a:solidFill>
+          </a:ln>
+        </p:spPr>
+      </p:cxnSp>
     </p:spTree>
   </p:cSld>
   <mc:AlternateContent>
@@ -2738,10 +3009,10 @@
   <a:themeElements>
     <a:clrScheme name="Office">
       <a:dk1>
-        <a:sysClr val="windowText" lastClr="000000"/>
+        <a:srgbClr val="000000"/>
       </a:dk1>
       <a:lt1>
-        <a:sysClr val="window" lastClr="FFFFFF"/>
+        <a:srgbClr val="ffffff"/>
       </a:lt1>
       <a:dk2>
         <a:srgbClr val="1f497d"/>
@@ -2839,7 +3110,7 @@
         </a:gradFill>
       </a:fillStyleLst>
       <a:lnStyleLst>
-        <a:ln w="9525" cap="flat" cmpd="sng" algn="ctr">
+        <a:ln w="6350" cap="flat" cmpd="sng" algn="ctr">
           <a:solidFill>
             <a:schemeClr val="phClr">
               <a:shade val="95000"/>
@@ -2849,14 +3120,14 @@
           <a:prstDash val="solid"/>
           <a:miter/>
         </a:ln>
-        <a:ln w="25400" cap="flat" cmpd="sng" algn="ctr">
+        <a:ln w="12700" cap="flat" cmpd="sng" algn="ctr">
           <a:solidFill>
             <a:schemeClr val="phClr"/>
           </a:solidFill>
           <a:prstDash val="solid"/>
           <a:miter/>
         </a:ln>
-        <a:ln w="38100" cap="flat" cmpd="sng" algn="ctr">
+        <a:ln w="19050" cap="flat" cmpd="sng" algn="ctr">
           <a:solidFill>
             <a:schemeClr val="phClr"/>
           </a:solidFill>
@@ -2866,13 +3137,10 @@
       </a:lnStyleLst>
       <a:effectStyleLst>
         <a:effectStyle>
-          <a:effectLst>
-            <a:outerShdw blurRad="40000" dist="20000" dir="5400000" rotWithShape="0">
-              <a:srgbClr val="000000">
-                <a:alpha val="38000"/>
-              </a:srgbClr>
-            </a:outerShdw>
-          </a:effectLst>
+          <a:effectLst/>
+        </a:effectStyle>
+        <a:effectStyle>
+          <a:effectLst/>
         </a:effectStyle>
         <a:effectStyle>
           <a:effectLst>
@@ -2882,26 +3150,6 @@
               </a:srgbClr>
             </a:outerShdw>
           </a:effectLst>
-        </a:effectStyle>
-        <a:effectStyle>
-          <a:effectLst>
-            <a:outerShdw blurRad="40000" dist="23000" dir="5400000" rotWithShape="0">
-              <a:srgbClr val="000000">
-                <a:alpha val="35000"/>
-              </a:srgbClr>
-            </a:outerShdw>
-          </a:effectLst>
-          <a:scene3d>
-            <a:camera prst="orthographicFront">
-              <a:rot lat="0" lon="0" rev="0"/>
-            </a:camera>
-            <a:lightRig rig="threePt" dir="t">
-              <a:rot lat="0" lon="0" rev="1200000"/>
-            </a:lightRig>
-          </a:scene3d>
-          <a:sp3d>
-            <a:bevelT w="63500" h="25400"/>
-          </a:sp3d>
         </a:effectStyle>
       </a:effectStyleLst>
       <a:bgFillStyleLst>

</xml_diff>

<commit_message>
Revert "#15-made changes to the data model for both organization and donation tables"
This reverts commit ea575a5c6b47c90f45bd4f6818a9c9cf41b87ee8.
</commit_message>
<xml_diff>
--- a/zakat.icclmd.data/zakat.data.model.pptx
+++ b/zakat.icclmd.data/zakat.data.model.pptx
@@ -36,7 +36,7 @@
             <a:spLocks noGrp="1"/>
           </p:cNvSpPr>
           <p:nvPr>
-            <p:ph type="ftr" idx="1"/>
+            <p:ph type="ftr" idx="2"/>
           </p:nvPr>
         </p:nvSpPr>
         <p:spPr/>
@@ -56,14 +56,14 @@
             <a:spLocks noGrp="1"/>
           </p:cNvSpPr>
           <p:nvPr>
-            <p:ph type="sldNum" idx="2"/>
-          </p:nvPr>
-        </p:nvSpPr>
-        <p:spPr/>
-        <p:txBody>
-          <a:bodyPr/>
-          <a:p>
-            <a:fld id="{D68632A0-6D92-4360-B512-D1968B24C37C}" type="slidenum">
+            <p:ph type="sldNum" idx="3"/>
+          </p:nvPr>
+        </p:nvSpPr>
+        <p:spPr/>
+        <p:txBody>
+          <a:bodyPr/>
+          <a:p>
+            <a:fld id="{53515172-D200-4541-B103-810A27A82990}" type="slidenum">
               <a:t>&lt;#&gt;</a:t>
             </a:fld>
           </a:p>
@@ -76,7 +76,7 @@
             <a:spLocks noGrp="1"/>
           </p:cNvSpPr>
           <p:nvPr>
-            <p:ph type="dt" idx="3"/>
+            <p:ph type="dt" idx="1"/>
           </p:nvPr>
         </p:nvSpPr>
         <p:spPr/>
@@ -114,7 +114,7 @@
       </p:grpSpPr>
       <p:sp>
         <p:nvSpPr>
-          <p:cNvPr id="24" name="PlaceHolder 1"/>
+          <p:cNvPr id="26" name="PlaceHolder 1"/>
           <p:cNvSpPr>
             <a:spLocks noGrp="1"/>
           </p:cNvSpPr>
@@ -125,7 +125,7 @@
         <p:spPr>
           <a:xfrm>
             <a:off x="504000" y="226080"/>
-            <a:ext cx="9072000" cy="946440"/>
+            <a:ext cx="9071640" cy="946440"/>
           </a:xfrm>
           <a:prstGeom prst="rect">
             <a:avLst/>
@@ -140,21 +140,18 @@
             <a:noAutofit/>
           </a:bodyPr>
           <a:p>
-            <a:pPr indent="0" algn="ctr">
+            <a:pPr algn="ctr">
               <a:buNone/>
             </a:pPr>
             <a:endParaRPr b="0" lang="en-US" sz="4400" spc="-1" strike="noStrike">
-              <a:solidFill>
-                <a:srgbClr val="000000"/>
-              </a:solidFill>
-              <a:latin typeface="Arial"/>
-            </a:endParaRPr>
-          </a:p>
-        </p:txBody>
-      </p:sp>
-      <p:sp>
-        <p:nvSpPr>
-          <p:cNvPr id="25" name="PlaceHolder 2"/>
+              <a:latin typeface="Arial"/>
+            </a:endParaRPr>
+          </a:p>
+        </p:txBody>
+      </p:sp>
+      <p:sp>
+        <p:nvSpPr>
+          <p:cNvPr id="27" name="PlaceHolder 2"/>
           <p:cNvSpPr>
             <a:spLocks noGrp="1"/>
           </p:cNvSpPr>
@@ -165,7 +162,7 @@
         <p:spPr>
           <a:xfrm>
             <a:off x="504000" y="1326600"/>
-            <a:ext cx="9072000" cy="1568520"/>
+            <a:ext cx="9071640" cy="1568160"/>
           </a:xfrm>
           <a:prstGeom prst="rect">
             <a:avLst/>
@@ -180,24 +177,15 @@
             <a:normAutofit/>
           </a:bodyPr>
           <a:p>
-            <a:pPr indent="0">
-              <a:spcBef>
-                <a:spcPts val="1417"/>
-              </a:spcBef>
-              <a:buNone/>
-            </a:pPr>
             <a:endParaRPr b="0" lang="en-US" sz="3200" spc="-1" strike="noStrike">
-              <a:solidFill>
-                <a:srgbClr val="000000"/>
-              </a:solidFill>
-              <a:latin typeface="Arial"/>
-            </a:endParaRPr>
-          </a:p>
-        </p:txBody>
-      </p:sp>
-      <p:sp>
-        <p:nvSpPr>
-          <p:cNvPr id="26" name="PlaceHolder 3"/>
+              <a:latin typeface="Arial"/>
+            </a:endParaRPr>
+          </a:p>
+        </p:txBody>
+      </p:sp>
+      <p:sp>
+        <p:nvSpPr>
+          <p:cNvPr id="28" name="PlaceHolder 3"/>
           <p:cNvSpPr>
             <a:spLocks noGrp="1"/>
           </p:cNvSpPr>
@@ -207,8 +195,8 @@
         </p:nvSpPr>
         <p:spPr>
           <a:xfrm>
-            <a:off x="504000" y="3044520"/>
-            <a:ext cx="9072000" cy="1568520"/>
+            <a:off x="504000" y="3044160"/>
+            <a:ext cx="9071640" cy="1568160"/>
           </a:xfrm>
           <a:prstGeom prst="rect">
             <a:avLst/>
@@ -223,16 +211,7 @@
             <a:normAutofit/>
           </a:bodyPr>
           <a:p>
-            <a:pPr indent="0">
-              <a:spcBef>
-                <a:spcPts val="1417"/>
-              </a:spcBef>
-              <a:buNone/>
-            </a:pPr>
             <a:endParaRPr b="0" lang="en-US" sz="3200" spc="-1" strike="noStrike">
-              <a:solidFill>
-                <a:srgbClr val="000000"/>
-              </a:solidFill>
               <a:latin typeface="Arial"/>
             </a:endParaRPr>
           </a:p>
@@ -245,7 +224,7 @@
             <a:spLocks noGrp="1"/>
           </p:cNvSpPr>
           <p:nvPr>
-            <p:ph type="ftr" idx="1"/>
+            <p:ph type="ftr" idx="2"/>
           </p:nvPr>
         </p:nvSpPr>
         <p:spPr/>
@@ -265,14 +244,14 @@
             <a:spLocks noGrp="1"/>
           </p:cNvSpPr>
           <p:nvPr>
-            <p:ph type="sldNum" idx="2"/>
-          </p:nvPr>
-        </p:nvSpPr>
-        <p:spPr/>
-        <p:txBody>
-          <a:bodyPr/>
-          <a:p>
-            <a:fld id="{D565D531-51FD-4CCE-B8F9-692291E8573F}" type="slidenum">
+            <p:ph type="sldNum" idx="3"/>
+          </p:nvPr>
+        </p:nvSpPr>
+        <p:spPr/>
+        <p:txBody>
+          <a:bodyPr/>
+          <a:p>
+            <a:fld id="{8331F424-1E6C-44F5-904C-36E90620680A}" type="slidenum">
               <a:t>&lt;#&gt;</a:t>
             </a:fld>
           </a:p>
@@ -285,7 +264,7 @@
             <a:spLocks noGrp="1"/>
           </p:cNvSpPr>
           <p:nvPr>
-            <p:ph type="dt" idx="3"/>
+            <p:ph type="dt" idx="1"/>
           </p:nvPr>
         </p:nvSpPr>
         <p:spPr/>
@@ -323,7 +302,7 @@
       </p:grpSpPr>
       <p:sp>
         <p:nvSpPr>
-          <p:cNvPr id="27" name="PlaceHolder 1"/>
+          <p:cNvPr id="29" name="PlaceHolder 1"/>
           <p:cNvSpPr>
             <a:spLocks noGrp="1"/>
           </p:cNvSpPr>
@@ -334,7 +313,7 @@
         <p:spPr>
           <a:xfrm>
             <a:off x="504000" y="226080"/>
-            <a:ext cx="9072000" cy="946440"/>
+            <a:ext cx="9071640" cy="946440"/>
           </a:xfrm>
           <a:prstGeom prst="rect">
             <a:avLst/>
@@ -349,21 +328,18 @@
             <a:noAutofit/>
           </a:bodyPr>
           <a:p>
-            <a:pPr indent="0" algn="ctr">
+            <a:pPr algn="ctr">
               <a:buNone/>
             </a:pPr>
             <a:endParaRPr b="0" lang="en-US" sz="4400" spc="-1" strike="noStrike">
-              <a:solidFill>
-                <a:srgbClr val="000000"/>
-              </a:solidFill>
-              <a:latin typeface="Arial"/>
-            </a:endParaRPr>
-          </a:p>
-        </p:txBody>
-      </p:sp>
-      <p:sp>
-        <p:nvSpPr>
-          <p:cNvPr id="28" name="PlaceHolder 2"/>
+              <a:latin typeface="Arial"/>
+            </a:endParaRPr>
+          </a:p>
+        </p:txBody>
+      </p:sp>
+      <p:sp>
+        <p:nvSpPr>
+          <p:cNvPr id="30" name="PlaceHolder 2"/>
           <p:cNvSpPr>
             <a:spLocks noGrp="1"/>
           </p:cNvSpPr>
@@ -374,7 +350,7 @@
         <p:spPr>
           <a:xfrm>
             <a:off x="504000" y="1326600"/>
-            <a:ext cx="4426920" cy="1568520"/>
+            <a:ext cx="4426920" cy="1568160"/>
           </a:xfrm>
           <a:prstGeom prst="rect">
             <a:avLst/>
@@ -389,24 +365,15 @@
             <a:normAutofit/>
           </a:bodyPr>
           <a:p>
-            <a:pPr indent="0">
-              <a:spcBef>
-                <a:spcPts val="1417"/>
-              </a:spcBef>
-              <a:buNone/>
-            </a:pPr>
             <a:endParaRPr b="0" lang="en-US" sz="3200" spc="-1" strike="noStrike">
-              <a:solidFill>
-                <a:srgbClr val="000000"/>
-              </a:solidFill>
-              <a:latin typeface="Arial"/>
-            </a:endParaRPr>
-          </a:p>
-        </p:txBody>
-      </p:sp>
-      <p:sp>
-        <p:nvSpPr>
-          <p:cNvPr id="29" name="PlaceHolder 3"/>
+              <a:latin typeface="Arial"/>
+            </a:endParaRPr>
+          </a:p>
+        </p:txBody>
+      </p:sp>
+      <p:sp>
+        <p:nvSpPr>
+          <p:cNvPr id="31" name="PlaceHolder 3"/>
           <p:cNvSpPr>
             <a:spLocks noGrp="1"/>
           </p:cNvSpPr>
@@ -417,7 +384,7 @@
         <p:spPr>
           <a:xfrm>
             <a:off x="5152680" y="1326600"/>
-            <a:ext cx="4426920" cy="1568520"/>
+            <a:ext cx="4426920" cy="1568160"/>
           </a:xfrm>
           <a:prstGeom prst="rect">
             <a:avLst/>
@@ -432,24 +399,15 @@
             <a:normAutofit/>
           </a:bodyPr>
           <a:p>
-            <a:pPr indent="0">
-              <a:spcBef>
-                <a:spcPts val="1417"/>
-              </a:spcBef>
-              <a:buNone/>
-            </a:pPr>
             <a:endParaRPr b="0" lang="en-US" sz="3200" spc="-1" strike="noStrike">
-              <a:solidFill>
-                <a:srgbClr val="000000"/>
-              </a:solidFill>
-              <a:latin typeface="Arial"/>
-            </a:endParaRPr>
-          </a:p>
-        </p:txBody>
-      </p:sp>
-      <p:sp>
-        <p:nvSpPr>
-          <p:cNvPr id="30" name="PlaceHolder 4"/>
+              <a:latin typeface="Arial"/>
+            </a:endParaRPr>
+          </a:p>
+        </p:txBody>
+      </p:sp>
+      <p:sp>
+        <p:nvSpPr>
+          <p:cNvPr id="32" name="PlaceHolder 4"/>
           <p:cNvSpPr>
             <a:spLocks noGrp="1"/>
           </p:cNvSpPr>
@@ -459,8 +417,8 @@
         </p:nvSpPr>
         <p:spPr>
           <a:xfrm>
-            <a:off x="504000" y="3044520"/>
-            <a:ext cx="4426920" cy="1568520"/>
+            <a:off x="504000" y="3044160"/>
+            <a:ext cx="4426920" cy="1568160"/>
           </a:xfrm>
           <a:prstGeom prst="rect">
             <a:avLst/>
@@ -475,24 +433,15 @@
             <a:normAutofit/>
           </a:bodyPr>
           <a:p>
-            <a:pPr indent="0">
-              <a:spcBef>
-                <a:spcPts val="1417"/>
-              </a:spcBef>
-              <a:buNone/>
-            </a:pPr>
             <a:endParaRPr b="0" lang="en-US" sz="3200" spc="-1" strike="noStrike">
-              <a:solidFill>
-                <a:srgbClr val="000000"/>
-              </a:solidFill>
-              <a:latin typeface="Arial"/>
-            </a:endParaRPr>
-          </a:p>
-        </p:txBody>
-      </p:sp>
-      <p:sp>
-        <p:nvSpPr>
-          <p:cNvPr id="31" name="PlaceHolder 5"/>
+              <a:latin typeface="Arial"/>
+            </a:endParaRPr>
+          </a:p>
+        </p:txBody>
+      </p:sp>
+      <p:sp>
+        <p:nvSpPr>
+          <p:cNvPr id="33" name="PlaceHolder 5"/>
           <p:cNvSpPr>
             <a:spLocks noGrp="1"/>
           </p:cNvSpPr>
@@ -502,8 +451,8 @@
         </p:nvSpPr>
         <p:spPr>
           <a:xfrm>
-            <a:off x="5152680" y="3044520"/>
-            <a:ext cx="4426920" cy="1568520"/>
+            <a:off x="5152680" y="3044160"/>
+            <a:ext cx="4426920" cy="1568160"/>
           </a:xfrm>
           <a:prstGeom prst="rect">
             <a:avLst/>
@@ -518,16 +467,7 @@
             <a:normAutofit/>
           </a:bodyPr>
           <a:p>
-            <a:pPr indent="0">
-              <a:spcBef>
-                <a:spcPts val="1417"/>
-              </a:spcBef>
-              <a:buNone/>
-            </a:pPr>
             <a:endParaRPr b="0" lang="en-US" sz="3200" spc="-1" strike="noStrike">
-              <a:solidFill>
-                <a:srgbClr val="000000"/>
-              </a:solidFill>
               <a:latin typeface="Arial"/>
             </a:endParaRPr>
           </a:p>
@@ -540,7 +480,7 @@
             <a:spLocks noGrp="1"/>
           </p:cNvSpPr>
           <p:nvPr>
-            <p:ph type="ftr" idx="1"/>
+            <p:ph type="ftr" idx="2"/>
           </p:nvPr>
         </p:nvSpPr>
         <p:spPr/>
@@ -560,14 +500,14 @@
             <a:spLocks noGrp="1"/>
           </p:cNvSpPr>
           <p:nvPr>
-            <p:ph type="sldNum" idx="2"/>
-          </p:nvPr>
-        </p:nvSpPr>
-        <p:spPr/>
-        <p:txBody>
-          <a:bodyPr/>
-          <a:p>
-            <a:fld id="{DC51CBB2-A2A3-4564-84A1-146D7B61141C}" type="slidenum">
+            <p:ph type="sldNum" idx="3"/>
+          </p:nvPr>
+        </p:nvSpPr>
+        <p:spPr/>
+        <p:txBody>
+          <a:bodyPr/>
+          <a:p>
+            <a:fld id="{1CA2685E-085B-41D2-972E-967E5FC2F9B6}" type="slidenum">
               <a:t>&lt;#&gt;</a:t>
             </a:fld>
           </a:p>
@@ -580,7 +520,7 @@
             <a:spLocks noGrp="1"/>
           </p:cNvSpPr>
           <p:nvPr>
-            <p:ph type="dt" idx="3"/>
+            <p:ph type="dt" idx="1"/>
           </p:nvPr>
         </p:nvSpPr>
         <p:spPr/>
@@ -618,7 +558,7 @@
       </p:grpSpPr>
       <p:sp>
         <p:nvSpPr>
-          <p:cNvPr id="32" name="PlaceHolder 1"/>
+          <p:cNvPr id="34" name="PlaceHolder 1"/>
           <p:cNvSpPr>
             <a:spLocks noGrp="1"/>
           </p:cNvSpPr>
@@ -629,7 +569,7 @@
         <p:spPr>
           <a:xfrm>
             <a:off x="504000" y="226080"/>
-            <a:ext cx="9072000" cy="946440"/>
+            <a:ext cx="9071640" cy="946440"/>
           </a:xfrm>
           <a:prstGeom prst="rect">
             <a:avLst/>
@@ -644,21 +584,18 @@
             <a:noAutofit/>
           </a:bodyPr>
           <a:p>
-            <a:pPr indent="0" algn="ctr">
+            <a:pPr algn="ctr">
               <a:buNone/>
             </a:pPr>
             <a:endParaRPr b="0" lang="en-US" sz="4400" spc="-1" strike="noStrike">
-              <a:solidFill>
-                <a:srgbClr val="000000"/>
-              </a:solidFill>
-              <a:latin typeface="Arial"/>
-            </a:endParaRPr>
-          </a:p>
-        </p:txBody>
-      </p:sp>
-      <p:sp>
-        <p:nvSpPr>
-          <p:cNvPr id="33" name="PlaceHolder 2"/>
+              <a:latin typeface="Arial"/>
+            </a:endParaRPr>
+          </a:p>
+        </p:txBody>
+      </p:sp>
+      <p:sp>
+        <p:nvSpPr>
+          <p:cNvPr id="35" name="PlaceHolder 2"/>
           <p:cNvSpPr>
             <a:spLocks noGrp="1"/>
           </p:cNvSpPr>
@@ -669,7 +606,7 @@
         <p:spPr>
           <a:xfrm>
             <a:off x="504000" y="1326600"/>
-            <a:ext cx="2921040" cy="1568520"/>
+            <a:ext cx="2920680" cy="1568160"/>
           </a:xfrm>
           <a:prstGeom prst="rect">
             <a:avLst/>
@@ -684,24 +621,15 @@
             <a:normAutofit/>
           </a:bodyPr>
           <a:p>
-            <a:pPr indent="0">
-              <a:spcBef>
-                <a:spcPts val="1417"/>
-              </a:spcBef>
-              <a:buNone/>
-            </a:pPr>
             <a:endParaRPr b="0" lang="en-US" sz="3200" spc="-1" strike="noStrike">
-              <a:solidFill>
-                <a:srgbClr val="000000"/>
-              </a:solidFill>
-              <a:latin typeface="Arial"/>
-            </a:endParaRPr>
-          </a:p>
-        </p:txBody>
-      </p:sp>
-      <p:sp>
-        <p:nvSpPr>
-          <p:cNvPr id="34" name="PlaceHolder 3"/>
+              <a:latin typeface="Arial"/>
+            </a:endParaRPr>
+          </a:p>
+        </p:txBody>
+      </p:sp>
+      <p:sp>
+        <p:nvSpPr>
+          <p:cNvPr id="36" name="PlaceHolder 3"/>
           <p:cNvSpPr>
             <a:spLocks noGrp="1"/>
           </p:cNvSpPr>
@@ -711,8 +639,8 @@
         </p:nvSpPr>
         <p:spPr>
           <a:xfrm>
-            <a:off x="3571560" y="1326600"/>
-            <a:ext cx="2921040" cy="1568520"/>
+            <a:off x="3571200" y="1326600"/>
+            <a:ext cx="2920680" cy="1568160"/>
           </a:xfrm>
           <a:prstGeom prst="rect">
             <a:avLst/>
@@ -727,24 +655,15 @@
             <a:normAutofit/>
           </a:bodyPr>
           <a:p>
-            <a:pPr indent="0">
-              <a:spcBef>
-                <a:spcPts val="1417"/>
-              </a:spcBef>
-              <a:buNone/>
-            </a:pPr>
             <a:endParaRPr b="0" lang="en-US" sz="3200" spc="-1" strike="noStrike">
-              <a:solidFill>
-                <a:srgbClr val="000000"/>
-              </a:solidFill>
-              <a:latin typeface="Arial"/>
-            </a:endParaRPr>
-          </a:p>
-        </p:txBody>
-      </p:sp>
-      <p:sp>
-        <p:nvSpPr>
-          <p:cNvPr id="35" name="PlaceHolder 4"/>
+              <a:latin typeface="Arial"/>
+            </a:endParaRPr>
+          </a:p>
+        </p:txBody>
+      </p:sp>
+      <p:sp>
+        <p:nvSpPr>
+          <p:cNvPr id="37" name="PlaceHolder 4"/>
           <p:cNvSpPr>
             <a:spLocks noGrp="1"/>
           </p:cNvSpPr>
@@ -754,8 +673,8 @@
         </p:nvSpPr>
         <p:spPr>
           <a:xfrm>
-            <a:off x="6639120" y="1326600"/>
-            <a:ext cx="2921040" cy="1568520"/>
+            <a:off x="6638040" y="1326600"/>
+            <a:ext cx="2920680" cy="1568160"/>
           </a:xfrm>
           <a:prstGeom prst="rect">
             <a:avLst/>
@@ -770,24 +689,15 @@
             <a:normAutofit/>
           </a:bodyPr>
           <a:p>
-            <a:pPr indent="0">
-              <a:spcBef>
-                <a:spcPts val="1417"/>
-              </a:spcBef>
-              <a:buNone/>
-            </a:pPr>
             <a:endParaRPr b="0" lang="en-US" sz="3200" spc="-1" strike="noStrike">
-              <a:solidFill>
-                <a:srgbClr val="000000"/>
-              </a:solidFill>
-              <a:latin typeface="Arial"/>
-            </a:endParaRPr>
-          </a:p>
-        </p:txBody>
-      </p:sp>
-      <p:sp>
-        <p:nvSpPr>
-          <p:cNvPr id="36" name="PlaceHolder 5"/>
+              <a:latin typeface="Arial"/>
+            </a:endParaRPr>
+          </a:p>
+        </p:txBody>
+      </p:sp>
+      <p:sp>
+        <p:nvSpPr>
+          <p:cNvPr id="38" name="PlaceHolder 5"/>
           <p:cNvSpPr>
             <a:spLocks noGrp="1"/>
           </p:cNvSpPr>
@@ -797,8 +707,8 @@
         </p:nvSpPr>
         <p:spPr>
           <a:xfrm>
-            <a:off x="504000" y="3044520"/>
-            <a:ext cx="2921040" cy="1568520"/>
+            <a:off x="504000" y="3044160"/>
+            <a:ext cx="2920680" cy="1568160"/>
           </a:xfrm>
           <a:prstGeom prst="rect">
             <a:avLst/>
@@ -813,24 +723,15 @@
             <a:normAutofit/>
           </a:bodyPr>
           <a:p>
-            <a:pPr indent="0">
-              <a:spcBef>
-                <a:spcPts val="1417"/>
-              </a:spcBef>
-              <a:buNone/>
-            </a:pPr>
             <a:endParaRPr b="0" lang="en-US" sz="3200" spc="-1" strike="noStrike">
-              <a:solidFill>
-                <a:srgbClr val="000000"/>
-              </a:solidFill>
-              <a:latin typeface="Arial"/>
-            </a:endParaRPr>
-          </a:p>
-        </p:txBody>
-      </p:sp>
-      <p:sp>
-        <p:nvSpPr>
-          <p:cNvPr id="37" name="PlaceHolder 6"/>
+              <a:latin typeface="Arial"/>
+            </a:endParaRPr>
+          </a:p>
+        </p:txBody>
+      </p:sp>
+      <p:sp>
+        <p:nvSpPr>
+          <p:cNvPr id="39" name="PlaceHolder 6"/>
           <p:cNvSpPr>
             <a:spLocks noGrp="1"/>
           </p:cNvSpPr>
@@ -840,8 +741,8 @@
         </p:nvSpPr>
         <p:spPr>
           <a:xfrm>
-            <a:off x="3571560" y="3044520"/>
-            <a:ext cx="2921040" cy="1568520"/>
+            <a:off x="3571200" y="3044160"/>
+            <a:ext cx="2920680" cy="1568160"/>
           </a:xfrm>
           <a:prstGeom prst="rect">
             <a:avLst/>
@@ -856,24 +757,15 @@
             <a:normAutofit/>
           </a:bodyPr>
           <a:p>
-            <a:pPr indent="0">
-              <a:spcBef>
-                <a:spcPts val="1417"/>
-              </a:spcBef>
-              <a:buNone/>
-            </a:pPr>
             <a:endParaRPr b="0" lang="en-US" sz="3200" spc="-1" strike="noStrike">
-              <a:solidFill>
-                <a:srgbClr val="000000"/>
-              </a:solidFill>
-              <a:latin typeface="Arial"/>
-            </a:endParaRPr>
-          </a:p>
-        </p:txBody>
-      </p:sp>
-      <p:sp>
-        <p:nvSpPr>
-          <p:cNvPr id="38" name="PlaceHolder 7"/>
+              <a:latin typeface="Arial"/>
+            </a:endParaRPr>
+          </a:p>
+        </p:txBody>
+      </p:sp>
+      <p:sp>
+        <p:nvSpPr>
+          <p:cNvPr id="40" name="PlaceHolder 7"/>
           <p:cNvSpPr>
             <a:spLocks noGrp="1"/>
           </p:cNvSpPr>
@@ -883,8 +775,8 @@
         </p:nvSpPr>
         <p:spPr>
           <a:xfrm>
-            <a:off x="6639120" y="3044520"/>
-            <a:ext cx="2921040" cy="1568520"/>
+            <a:off x="6638040" y="3044160"/>
+            <a:ext cx="2920680" cy="1568160"/>
           </a:xfrm>
           <a:prstGeom prst="rect">
             <a:avLst/>
@@ -899,16 +791,7 @@
             <a:normAutofit/>
           </a:bodyPr>
           <a:p>
-            <a:pPr indent="0">
-              <a:spcBef>
-                <a:spcPts val="1417"/>
-              </a:spcBef>
-              <a:buNone/>
-            </a:pPr>
             <a:endParaRPr b="0" lang="en-US" sz="3200" spc="-1" strike="noStrike">
-              <a:solidFill>
-                <a:srgbClr val="000000"/>
-              </a:solidFill>
               <a:latin typeface="Arial"/>
             </a:endParaRPr>
           </a:p>
@@ -921,7 +804,7 @@
             <a:spLocks noGrp="1"/>
           </p:cNvSpPr>
           <p:nvPr>
-            <p:ph type="ftr" idx="1"/>
+            <p:ph type="ftr" idx="2"/>
           </p:nvPr>
         </p:nvSpPr>
         <p:spPr/>
@@ -941,14 +824,14 @@
             <a:spLocks noGrp="1"/>
           </p:cNvSpPr>
           <p:nvPr>
-            <p:ph type="sldNum" idx="2"/>
-          </p:nvPr>
-        </p:nvSpPr>
-        <p:spPr/>
-        <p:txBody>
-          <a:bodyPr/>
-          <a:p>
-            <a:fld id="{FA51F155-96B4-4B42-8AE8-E59F8724B468}" type="slidenum">
+            <p:ph type="sldNum" idx="3"/>
+          </p:nvPr>
+        </p:nvSpPr>
+        <p:spPr/>
+        <p:txBody>
+          <a:bodyPr/>
+          <a:p>
+            <a:fld id="{797CC7FB-8CB8-4A01-A684-382B9131663A}" type="slidenum">
               <a:t>&lt;#&gt;</a:t>
             </a:fld>
           </a:p>
@@ -961,7 +844,7 @@
             <a:spLocks noGrp="1"/>
           </p:cNvSpPr>
           <p:nvPr>
-            <p:ph type="dt" idx="3"/>
+            <p:ph type="dt" idx="1"/>
           </p:nvPr>
         </p:nvSpPr>
         <p:spPr/>
@@ -999,7 +882,7 @@
       </p:grpSpPr>
       <p:sp>
         <p:nvSpPr>
-          <p:cNvPr id="3" name="PlaceHolder 1"/>
+          <p:cNvPr id="5" name="PlaceHolder 1"/>
           <p:cNvSpPr>
             <a:spLocks noGrp="1"/>
           </p:cNvSpPr>
@@ -1010,7 +893,7 @@
         <p:spPr>
           <a:xfrm>
             <a:off x="504000" y="226080"/>
-            <a:ext cx="9072000" cy="946440"/>
+            <a:ext cx="9071640" cy="946440"/>
           </a:xfrm>
           <a:prstGeom prst="rect">
             <a:avLst/>
@@ -1025,21 +908,18 @@
             <a:noAutofit/>
           </a:bodyPr>
           <a:p>
-            <a:pPr indent="0" algn="ctr">
+            <a:pPr algn="ctr">
               <a:buNone/>
             </a:pPr>
             <a:endParaRPr b="0" lang="en-US" sz="4400" spc="-1" strike="noStrike">
-              <a:solidFill>
-                <a:srgbClr val="000000"/>
-              </a:solidFill>
-              <a:latin typeface="Arial"/>
-            </a:endParaRPr>
-          </a:p>
-        </p:txBody>
-      </p:sp>
-      <p:sp>
-        <p:nvSpPr>
-          <p:cNvPr id="4" name="PlaceHolder 2"/>
+              <a:latin typeface="Arial"/>
+            </a:endParaRPr>
+          </a:p>
+        </p:txBody>
+      </p:sp>
+      <p:sp>
+        <p:nvSpPr>
+          <p:cNvPr id="6" name="PlaceHolder 2"/>
           <p:cNvSpPr>
             <a:spLocks noGrp="1"/>
           </p:cNvSpPr>
@@ -1050,7 +930,7 @@
         <p:spPr>
           <a:xfrm>
             <a:off x="504000" y="1326600"/>
-            <a:ext cx="9072000" cy="3288600"/>
+            <a:ext cx="9071640" cy="3288240"/>
           </a:xfrm>
           <a:prstGeom prst="rect">
             <a:avLst/>
@@ -1065,13 +945,10 @@
             <a:noAutofit/>
           </a:bodyPr>
           <a:p>
-            <a:pPr indent="0" algn="ctr">
+            <a:pPr algn="ctr">
               <a:buNone/>
             </a:pPr>
             <a:endParaRPr b="0" lang="en-US" sz="3200" spc="-1" strike="noStrike">
-              <a:solidFill>
-                <a:srgbClr val="000000"/>
-              </a:solidFill>
               <a:latin typeface="Arial"/>
             </a:endParaRPr>
           </a:p>
@@ -1084,7 +961,7 @@
             <a:spLocks noGrp="1"/>
           </p:cNvSpPr>
           <p:nvPr>
-            <p:ph type="ftr" idx="1"/>
+            <p:ph type="ftr" idx="2"/>
           </p:nvPr>
         </p:nvSpPr>
         <p:spPr/>
@@ -1104,14 +981,14 @@
             <a:spLocks noGrp="1"/>
           </p:cNvSpPr>
           <p:nvPr>
-            <p:ph type="sldNum" idx="2"/>
-          </p:nvPr>
-        </p:nvSpPr>
-        <p:spPr/>
-        <p:txBody>
-          <a:bodyPr/>
-          <a:p>
-            <a:fld id="{C22D12F7-1819-4960-A1D9-3357A7A7D10C}" type="slidenum">
+            <p:ph type="sldNum" idx="3"/>
+          </p:nvPr>
+        </p:nvSpPr>
+        <p:spPr/>
+        <p:txBody>
+          <a:bodyPr/>
+          <a:p>
+            <a:fld id="{1BFAA72E-3EE9-434F-A696-9DC787C4F1A2}" type="slidenum">
               <a:t>&lt;#&gt;</a:t>
             </a:fld>
           </a:p>
@@ -1124,7 +1001,7 @@
             <a:spLocks noGrp="1"/>
           </p:cNvSpPr>
           <p:nvPr>
-            <p:ph type="dt" idx="3"/>
+            <p:ph type="dt" idx="1"/>
           </p:nvPr>
         </p:nvSpPr>
         <p:spPr/>
@@ -1162,7 +1039,7 @@
       </p:grpSpPr>
       <p:sp>
         <p:nvSpPr>
-          <p:cNvPr id="5" name="PlaceHolder 1"/>
+          <p:cNvPr id="7" name="PlaceHolder 1"/>
           <p:cNvSpPr>
             <a:spLocks noGrp="1"/>
           </p:cNvSpPr>
@@ -1173,7 +1050,7 @@
         <p:spPr>
           <a:xfrm>
             <a:off x="504000" y="226080"/>
-            <a:ext cx="9072000" cy="946440"/>
+            <a:ext cx="9071640" cy="946440"/>
           </a:xfrm>
           <a:prstGeom prst="rect">
             <a:avLst/>
@@ -1188,21 +1065,18 @@
             <a:noAutofit/>
           </a:bodyPr>
           <a:p>
-            <a:pPr indent="0" algn="ctr">
+            <a:pPr algn="ctr">
               <a:buNone/>
             </a:pPr>
             <a:endParaRPr b="0" lang="en-US" sz="4400" spc="-1" strike="noStrike">
-              <a:solidFill>
-                <a:srgbClr val="000000"/>
-              </a:solidFill>
-              <a:latin typeface="Arial"/>
-            </a:endParaRPr>
-          </a:p>
-        </p:txBody>
-      </p:sp>
-      <p:sp>
-        <p:nvSpPr>
-          <p:cNvPr id="6" name="PlaceHolder 2"/>
+              <a:latin typeface="Arial"/>
+            </a:endParaRPr>
+          </a:p>
+        </p:txBody>
+      </p:sp>
+      <p:sp>
+        <p:nvSpPr>
+          <p:cNvPr id="8" name="PlaceHolder 2"/>
           <p:cNvSpPr>
             <a:spLocks noGrp="1"/>
           </p:cNvSpPr>
@@ -1213,7 +1087,7 @@
         <p:spPr>
           <a:xfrm>
             <a:off x="504000" y="1326600"/>
-            <a:ext cx="9072000" cy="3288600"/>
+            <a:ext cx="9071640" cy="3288240"/>
           </a:xfrm>
           <a:prstGeom prst="rect">
             <a:avLst/>
@@ -1228,16 +1102,7 @@
             <a:normAutofit/>
           </a:bodyPr>
           <a:p>
-            <a:pPr indent="0">
-              <a:spcBef>
-                <a:spcPts val="1417"/>
-              </a:spcBef>
-              <a:buNone/>
-            </a:pPr>
             <a:endParaRPr b="0" lang="en-US" sz="3200" spc="-1" strike="noStrike">
-              <a:solidFill>
-                <a:srgbClr val="000000"/>
-              </a:solidFill>
               <a:latin typeface="Arial"/>
             </a:endParaRPr>
           </a:p>
@@ -1250,7 +1115,7 @@
             <a:spLocks noGrp="1"/>
           </p:cNvSpPr>
           <p:nvPr>
-            <p:ph type="ftr" idx="1"/>
+            <p:ph type="ftr" idx="2"/>
           </p:nvPr>
         </p:nvSpPr>
         <p:spPr/>
@@ -1270,14 +1135,14 @@
             <a:spLocks noGrp="1"/>
           </p:cNvSpPr>
           <p:nvPr>
-            <p:ph type="sldNum" idx="2"/>
-          </p:nvPr>
-        </p:nvSpPr>
-        <p:spPr/>
-        <p:txBody>
-          <a:bodyPr/>
-          <a:p>
-            <a:fld id="{10D53723-CD5C-40A1-8E54-5D522938B12D}" type="slidenum">
+            <p:ph type="sldNum" idx="3"/>
+          </p:nvPr>
+        </p:nvSpPr>
+        <p:spPr/>
+        <p:txBody>
+          <a:bodyPr/>
+          <a:p>
+            <a:fld id="{DEA4C372-8AC4-43EE-BF91-F9C19D67D8DE}" type="slidenum">
               <a:t>&lt;#&gt;</a:t>
             </a:fld>
           </a:p>
@@ -1290,7 +1155,7 @@
             <a:spLocks noGrp="1"/>
           </p:cNvSpPr>
           <p:nvPr>
-            <p:ph type="dt" idx="3"/>
+            <p:ph type="dt" idx="1"/>
           </p:nvPr>
         </p:nvSpPr>
         <p:spPr/>
@@ -1328,7 +1193,7 @@
       </p:grpSpPr>
       <p:sp>
         <p:nvSpPr>
-          <p:cNvPr id="7" name="PlaceHolder 1"/>
+          <p:cNvPr id="9" name="PlaceHolder 1"/>
           <p:cNvSpPr>
             <a:spLocks noGrp="1"/>
           </p:cNvSpPr>
@@ -1339,7 +1204,7 @@
         <p:spPr>
           <a:xfrm>
             <a:off x="504000" y="226080"/>
-            <a:ext cx="9072000" cy="946440"/>
+            <a:ext cx="9071640" cy="946440"/>
           </a:xfrm>
           <a:prstGeom prst="rect">
             <a:avLst/>
@@ -1354,21 +1219,18 @@
             <a:noAutofit/>
           </a:bodyPr>
           <a:p>
-            <a:pPr indent="0" algn="ctr">
+            <a:pPr algn="ctr">
               <a:buNone/>
             </a:pPr>
             <a:endParaRPr b="0" lang="en-US" sz="4400" spc="-1" strike="noStrike">
-              <a:solidFill>
-                <a:srgbClr val="000000"/>
-              </a:solidFill>
-              <a:latin typeface="Arial"/>
-            </a:endParaRPr>
-          </a:p>
-        </p:txBody>
-      </p:sp>
-      <p:sp>
-        <p:nvSpPr>
-          <p:cNvPr id="8" name="PlaceHolder 2"/>
+              <a:latin typeface="Arial"/>
+            </a:endParaRPr>
+          </a:p>
+        </p:txBody>
+      </p:sp>
+      <p:sp>
+        <p:nvSpPr>
+          <p:cNvPr id="10" name="PlaceHolder 2"/>
           <p:cNvSpPr>
             <a:spLocks noGrp="1"/>
           </p:cNvSpPr>
@@ -1379,7 +1241,7 @@
         <p:spPr>
           <a:xfrm>
             <a:off x="504000" y="1326600"/>
-            <a:ext cx="4426920" cy="3288600"/>
+            <a:ext cx="4426920" cy="3288240"/>
           </a:xfrm>
           <a:prstGeom prst="rect">
             <a:avLst/>
@@ -1394,24 +1256,15 @@
             <a:normAutofit/>
           </a:bodyPr>
           <a:p>
-            <a:pPr indent="0">
-              <a:spcBef>
-                <a:spcPts val="1417"/>
-              </a:spcBef>
-              <a:buNone/>
-            </a:pPr>
             <a:endParaRPr b="0" lang="en-US" sz="3200" spc="-1" strike="noStrike">
-              <a:solidFill>
-                <a:srgbClr val="000000"/>
-              </a:solidFill>
-              <a:latin typeface="Arial"/>
-            </a:endParaRPr>
-          </a:p>
-        </p:txBody>
-      </p:sp>
-      <p:sp>
-        <p:nvSpPr>
-          <p:cNvPr id="9" name="PlaceHolder 3"/>
+              <a:latin typeface="Arial"/>
+            </a:endParaRPr>
+          </a:p>
+        </p:txBody>
+      </p:sp>
+      <p:sp>
+        <p:nvSpPr>
+          <p:cNvPr id="11" name="PlaceHolder 3"/>
           <p:cNvSpPr>
             <a:spLocks noGrp="1"/>
           </p:cNvSpPr>
@@ -1422,7 +1275,7 @@
         <p:spPr>
           <a:xfrm>
             <a:off x="5152680" y="1326600"/>
-            <a:ext cx="4426920" cy="3288600"/>
+            <a:ext cx="4426920" cy="3288240"/>
           </a:xfrm>
           <a:prstGeom prst="rect">
             <a:avLst/>
@@ -1437,16 +1290,7 @@
             <a:normAutofit/>
           </a:bodyPr>
           <a:p>
-            <a:pPr indent="0">
-              <a:spcBef>
-                <a:spcPts val="1417"/>
-              </a:spcBef>
-              <a:buNone/>
-            </a:pPr>
             <a:endParaRPr b="0" lang="en-US" sz="3200" spc="-1" strike="noStrike">
-              <a:solidFill>
-                <a:srgbClr val="000000"/>
-              </a:solidFill>
               <a:latin typeface="Arial"/>
             </a:endParaRPr>
           </a:p>
@@ -1459,7 +1303,7 @@
             <a:spLocks noGrp="1"/>
           </p:cNvSpPr>
           <p:nvPr>
-            <p:ph type="ftr" idx="1"/>
+            <p:ph type="ftr" idx="2"/>
           </p:nvPr>
         </p:nvSpPr>
         <p:spPr/>
@@ -1479,14 +1323,14 @@
             <a:spLocks noGrp="1"/>
           </p:cNvSpPr>
           <p:nvPr>
-            <p:ph type="sldNum" idx="2"/>
-          </p:nvPr>
-        </p:nvSpPr>
-        <p:spPr/>
-        <p:txBody>
-          <a:bodyPr/>
-          <a:p>
-            <a:fld id="{AC0B285C-F92F-4B3F-9DE6-1DEB286232D9}" type="slidenum">
+            <p:ph type="sldNum" idx="3"/>
+          </p:nvPr>
+        </p:nvSpPr>
+        <p:spPr/>
+        <p:txBody>
+          <a:bodyPr/>
+          <a:p>
+            <a:fld id="{915FC2E6-AA20-4606-81D3-C57E1E23D631}" type="slidenum">
               <a:t>&lt;#&gt;</a:t>
             </a:fld>
           </a:p>
@@ -1499,7 +1343,7 @@
             <a:spLocks noGrp="1"/>
           </p:cNvSpPr>
           <p:nvPr>
-            <p:ph type="dt" idx="3"/>
+            <p:ph type="dt" idx="1"/>
           </p:nvPr>
         </p:nvSpPr>
         <p:spPr/>
@@ -1537,7 +1381,7 @@
       </p:grpSpPr>
       <p:sp>
         <p:nvSpPr>
-          <p:cNvPr id="10" name="PlaceHolder 1"/>
+          <p:cNvPr id="12" name="PlaceHolder 1"/>
           <p:cNvSpPr>
             <a:spLocks noGrp="1"/>
           </p:cNvSpPr>
@@ -1548,7 +1392,7 @@
         <p:spPr>
           <a:xfrm>
             <a:off x="504000" y="226080"/>
-            <a:ext cx="9072000" cy="946440"/>
+            <a:ext cx="9071640" cy="946440"/>
           </a:xfrm>
           <a:prstGeom prst="rect">
             <a:avLst/>
@@ -1563,13 +1407,10 @@
             <a:noAutofit/>
           </a:bodyPr>
           <a:p>
-            <a:pPr indent="0" algn="ctr">
+            <a:pPr algn="ctr">
               <a:buNone/>
             </a:pPr>
             <a:endParaRPr b="0" lang="en-US" sz="4400" spc="-1" strike="noStrike">
-              <a:solidFill>
-                <a:srgbClr val="000000"/>
-              </a:solidFill>
               <a:latin typeface="Arial"/>
             </a:endParaRPr>
           </a:p>
@@ -1582,7 +1423,7 @@
             <a:spLocks noGrp="1"/>
           </p:cNvSpPr>
           <p:nvPr>
-            <p:ph type="ftr" idx="1"/>
+            <p:ph type="ftr" idx="2"/>
           </p:nvPr>
         </p:nvSpPr>
         <p:spPr/>
@@ -1602,14 +1443,14 @@
             <a:spLocks noGrp="1"/>
           </p:cNvSpPr>
           <p:nvPr>
-            <p:ph type="sldNum" idx="2"/>
-          </p:nvPr>
-        </p:nvSpPr>
-        <p:spPr/>
-        <p:txBody>
-          <a:bodyPr/>
-          <a:p>
-            <a:fld id="{8C45F138-9507-41EE-81AB-F70C5BC10A79}" type="slidenum">
+            <p:ph type="sldNum" idx="3"/>
+          </p:nvPr>
+        </p:nvSpPr>
+        <p:spPr/>
+        <p:txBody>
+          <a:bodyPr/>
+          <a:p>
+            <a:fld id="{2AEE10BE-BCA0-43FC-9773-490EB7C771EE}" type="slidenum">
               <a:t>&lt;#&gt;</a:t>
             </a:fld>
           </a:p>
@@ -1622,7 +1463,7 @@
             <a:spLocks noGrp="1"/>
           </p:cNvSpPr>
           <p:nvPr>
-            <p:ph type="dt" idx="3"/>
+            <p:ph type="dt" idx="1"/>
           </p:nvPr>
         </p:nvSpPr>
         <p:spPr/>
@@ -1660,7 +1501,7 @@
       </p:grpSpPr>
       <p:sp>
         <p:nvSpPr>
-          <p:cNvPr id="11" name="PlaceHolder 1"/>
+          <p:cNvPr id="13" name="PlaceHolder 1"/>
           <p:cNvSpPr>
             <a:spLocks noGrp="1"/>
           </p:cNvSpPr>
@@ -1671,7 +1512,7 @@
         <p:spPr>
           <a:xfrm>
             <a:off x="504000" y="226080"/>
-            <a:ext cx="9072000" cy="4388400"/>
+            <a:ext cx="9071640" cy="4388400"/>
           </a:xfrm>
           <a:prstGeom prst="rect">
             <a:avLst/>
@@ -1686,11 +1527,10 @@
             <a:noAutofit/>
           </a:bodyPr>
           <a:p>
-            <a:pPr algn="ctr"/>
+            <a:pPr algn="ctr">
+              <a:buNone/>
+            </a:pPr>
             <a:endParaRPr b="0" lang="en-US" sz="3200" spc="-1" strike="noStrike">
-              <a:solidFill>
-                <a:srgbClr val="000000"/>
-              </a:solidFill>
               <a:latin typeface="Arial"/>
             </a:endParaRPr>
           </a:p>
@@ -1703,7 +1543,7 @@
             <a:spLocks noGrp="1"/>
           </p:cNvSpPr>
           <p:nvPr>
-            <p:ph type="ftr" idx="1"/>
+            <p:ph type="ftr" idx="2"/>
           </p:nvPr>
         </p:nvSpPr>
         <p:spPr/>
@@ -1723,14 +1563,14 @@
             <a:spLocks noGrp="1"/>
           </p:cNvSpPr>
           <p:nvPr>
-            <p:ph type="sldNum" idx="2"/>
-          </p:nvPr>
-        </p:nvSpPr>
-        <p:spPr/>
-        <p:txBody>
-          <a:bodyPr/>
-          <a:p>
-            <a:fld id="{38A0A7B9-39AD-407C-8362-B7A368B5C71A}" type="slidenum">
+            <p:ph type="sldNum" idx="3"/>
+          </p:nvPr>
+        </p:nvSpPr>
+        <p:spPr/>
+        <p:txBody>
+          <a:bodyPr/>
+          <a:p>
+            <a:fld id="{A3072476-8289-436C-AE30-CF9662F825C0}" type="slidenum">
               <a:t>&lt;#&gt;</a:t>
             </a:fld>
           </a:p>
@@ -1743,7 +1583,7 @@
             <a:spLocks noGrp="1"/>
           </p:cNvSpPr>
           <p:nvPr>
-            <p:ph type="dt" idx="3"/>
+            <p:ph type="dt" idx="1"/>
           </p:nvPr>
         </p:nvSpPr>
         <p:spPr/>
@@ -1781,7 +1621,7 @@
       </p:grpSpPr>
       <p:sp>
         <p:nvSpPr>
-          <p:cNvPr id="12" name="PlaceHolder 1"/>
+          <p:cNvPr id="14" name="PlaceHolder 1"/>
           <p:cNvSpPr>
             <a:spLocks noGrp="1"/>
           </p:cNvSpPr>
@@ -1792,7 +1632,7 @@
         <p:spPr>
           <a:xfrm>
             <a:off x="504000" y="226080"/>
-            <a:ext cx="9072000" cy="946440"/>
+            <a:ext cx="9071640" cy="946440"/>
           </a:xfrm>
           <a:prstGeom prst="rect">
             <a:avLst/>
@@ -1807,21 +1647,18 @@
             <a:noAutofit/>
           </a:bodyPr>
           <a:p>
-            <a:pPr indent="0" algn="ctr">
+            <a:pPr algn="ctr">
               <a:buNone/>
             </a:pPr>
             <a:endParaRPr b="0" lang="en-US" sz="4400" spc="-1" strike="noStrike">
-              <a:solidFill>
-                <a:srgbClr val="000000"/>
-              </a:solidFill>
-              <a:latin typeface="Arial"/>
-            </a:endParaRPr>
-          </a:p>
-        </p:txBody>
-      </p:sp>
-      <p:sp>
-        <p:nvSpPr>
-          <p:cNvPr id="13" name="PlaceHolder 2"/>
+              <a:latin typeface="Arial"/>
+            </a:endParaRPr>
+          </a:p>
+        </p:txBody>
+      </p:sp>
+      <p:sp>
+        <p:nvSpPr>
+          <p:cNvPr id="15" name="PlaceHolder 2"/>
           <p:cNvSpPr>
             <a:spLocks noGrp="1"/>
           </p:cNvSpPr>
@@ -1832,7 +1669,7 @@
         <p:spPr>
           <a:xfrm>
             <a:off x="504000" y="1326600"/>
-            <a:ext cx="4426920" cy="1568520"/>
+            <a:ext cx="4426920" cy="1568160"/>
           </a:xfrm>
           <a:prstGeom prst="rect">
             <a:avLst/>
@@ -1847,24 +1684,15 @@
             <a:normAutofit/>
           </a:bodyPr>
           <a:p>
-            <a:pPr indent="0">
-              <a:spcBef>
-                <a:spcPts val="1417"/>
-              </a:spcBef>
-              <a:buNone/>
-            </a:pPr>
             <a:endParaRPr b="0" lang="en-US" sz="3200" spc="-1" strike="noStrike">
-              <a:solidFill>
-                <a:srgbClr val="000000"/>
-              </a:solidFill>
-              <a:latin typeface="Arial"/>
-            </a:endParaRPr>
-          </a:p>
-        </p:txBody>
-      </p:sp>
-      <p:sp>
-        <p:nvSpPr>
-          <p:cNvPr id="14" name="PlaceHolder 3"/>
+              <a:latin typeface="Arial"/>
+            </a:endParaRPr>
+          </a:p>
+        </p:txBody>
+      </p:sp>
+      <p:sp>
+        <p:nvSpPr>
+          <p:cNvPr id="16" name="PlaceHolder 3"/>
           <p:cNvSpPr>
             <a:spLocks noGrp="1"/>
           </p:cNvSpPr>
@@ -1875,7 +1703,7 @@
         <p:spPr>
           <a:xfrm>
             <a:off x="5152680" y="1326600"/>
-            <a:ext cx="4426920" cy="3288600"/>
+            <a:ext cx="4426920" cy="3288240"/>
           </a:xfrm>
           <a:prstGeom prst="rect">
             <a:avLst/>
@@ -1890,24 +1718,15 @@
             <a:normAutofit/>
           </a:bodyPr>
           <a:p>
-            <a:pPr indent="0">
-              <a:spcBef>
-                <a:spcPts val="1417"/>
-              </a:spcBef>
-              <a:buNone/>
-            </a:pPr>
             <a:endParaRPr b="0" lang="en-US" sz="3200" spc="-1" strike="noStrike">
-              <a:solidFill>
-                <a:srgbClr val="000000"/>
-              </a:solidFill>
-              <a:latin typeface="Arial"/>
-            </a:endParaRPr>
-          </a:p>
-        </p:txBody>
-      </p:sp>
-      <p:sp>
-        <p:nvSpPr>
-          <p:cNvPr id="15" name="PlaceHolder 4"/>
+              <a:latin typeface="Arial"/>
+            </a:endParaRPr>
+          </a:p>
+        </p:txBody>
+      </p:sp>
+      <p:sp>
+        <p:nvSpPr>
+          <p:cNvPr id="17" name="PlaceHolder 4"/>
           <p:cNvSpPr>
             <a:spLocks noGrp="1"/>
           </p:cNvSpPr>
@@ -1917,8 +1736,8 @@
         </p:nvSpPr>
         <p:spPr>
           <a:xfrm>
-            <a:off x="504000" y="3044520"/>
-            <a:ext cx="4426920" cy="1568520"/>
+            <a:off x="504000" y="3044160"/>
+            <a:ext cx="4426920" cy="1568160"/>
           </a:xfrm>
           <a:prstGeom prst="rect">
             <a:avLst/>
@@ -1933,16 +1752,7 @@
             <a:normAutofit/>
           </a:bodyPr>
           <a:p>
-            <a:pPr indent="0">
-              <a:spcBef>
-                <a:spcPts val="1417"/>
-              </a:spcBef>
-              <a:buNone/>
-            </a:pPr>
             <a:endParaRPr b="0" lang="en-US" sz="3200" spc="-1" strike="noStrike">
-              <a:solidFill>
-                <a:srgbClr val="000000"/>
-              </a:solidFill>
               <a:latin typeface="Arial"/>
             </a:endParaRPr>
           </a:p>
@@ -1955,7 +1765,7 @@
             <a:spLocks noGrp="1"/>
           </p:cNvSpPr>
           <p:nvPr>
-            <p:ph type="ftr" idx="1"/>
+            <p:ph type="ftr" idx="2"/>
           </p:nvPr>
         </p:nvSpPr>
         <p:spPr/>
@@ -1975,14 +1785,14 @@
             <a:spLocks noGrp="1"/>
           </p:cNvSpPr>
           <p:nvPr>
-            <p:ph type="sldNum" idx="2"/>
-          </p:nvPr>
-        </p:nvSpPr>
-        <p:spPr/>
-        <p:txBody>
-          <a:bodyPr/>
-          <a:p>
-            <a:fld id="{E8C5E0B1-2294-484A-82E3-D74D6B5C2FB5}" type="slidenum">
+            <p:ph type="sldNum" idx="3"/>
+          </p:nvPr>
+        </p:nvSpPr>
+        <p:spPr/>
+        <p:txBody>
+          <a:bodyPr/>
+          <a:p>
+            <a:fld id="{F17624DA-FF90-4BD5-9C66-F60F5103BA22}" type="slidenum">
               <a:t>&lt;#&gt;</a:t>
             </a:fld>
           </a:p>
@@ -1995,7 +1805,7 @@
             <a:spLocks noGrp="1"/>
           </p:cNvSpPr>
           <p:nvPr>
-            <p:ph type="dt" idx="3"/>
+            <p:ph type="dt" idx="1"/>
           </p:nvPr>
         </p:nvSpPr>
         <p:spPr/>
@@ -2033,7 +1843,7 @@
       </p:grpSpPr>
       <p:sp>
         <p:nvSpPr>
-          <p:cNvPr id="16" name="PlaceHolder 1"/>
+          <p:cNvPr id="18" name="PlaceHolder 1"/>
           <p:cNvSpPr>
             <a:spLocks noGrp="1"/>
           </p:cNvSpPr>
@@ -2044,7 +1854,7 @@
         <p:spPr>
           <a:xfrm>
             <a:off x="504000" y="226080"/>
-            <a:ext cx="9072000" cy="946440"/>
+            <a:ext cx="9071640" cy="946440"/>
           </a:xfrm>
           <a:prstGeom prst="rect">
             <a:avLst/>
@@ -2059,21 +1869,18 @@
             <a:noAutofit/>
           </a:bodyPr>
           <a:p>
-            <a:pPr indent="0" algn="ctr">
+            <a:pPr algn="ctr">
               <a:buNone/>
             </a:pPr>
             <a:endParaRPr b="0" lang="en-US" sz="4400" spc="-1" strike="noStrike">
-              <a:solidFill>
-                <a:srgbClr val="000000"/>
-              </a:solidFill>
-              <a:latin typeface="Arial"/>
-            </a:endParaRPr>
-          </a:p>
-        </p:txBody>
-      </p:sp>
-      <p:sp>
-        <p:nvSpPr>
-          <p:cNvPr id="17" name="PlaceHolder 2"/>
+              <a:latin typeface="Arial"/>
+            </a:endParaRPr>
+          </a:p>
+        </p:txBody>
+      </p:sp>
+      <p:sp>
+        <p:nvSpPr>
+          <p:cNvPr id="19" name="PlaceHolder 2"/>
           <p:cNvSpPr>
             <a:spLocks noGrp="1"/>
           </p:cNvSpPr>
@@ -2084,7 +1891,7 @@
         <p:spPr>
           <a:xfrm>
             <a:off x="504000" y="1326600"/>
-            <a:ext cx="4426920" cy="3288600"/>
+            <a:ext cx="4426920" cy="3288240"/>
           </a:xfrm>
           <a:prstGeom prst="rect">
             <a:avLst/>
@@ -2099,24 +1906,15 @@
             <a:normAutofit/>
           </a:bodyPr>
           <a:p>
-            <a:pPr indent="0">
-              <a:spcBef>
-                <a:spcPts val="1417"/>
-              </a:spcBef>
-              <a:buNone/>
-            </a:pPr>
             <a:endParaRPr b="0" lang="en-US" sz="3200" spc="-1" strike="noStrike">
-              <a:solidFill>
-                <a:srgbClr val="000000"/>
-              </a:solidFill>
-              <a:latin typeface="Arial"/>
-            </a:endParaRPr>
-          </a:p>
-        </p:txBody>
-      </p:sp>
-      <p:sp>
-        <p:nvSpPr>
-          <p:cNvPr id="18" name="PlaceHolder 3"/>
+              <a:latin typeface="Arial"/>
+            </a:endParaRPr>
+          </a:p>
+        </p:txBody>
+      </p:sp>
+      <p:sp>
+        <p:nvSpPr>
+          <p:cNvPr id="20" name="PlaceHolder 3"/>
           <p:cNvSpPr>
             <a:spLocks noGrp="1"/>
           </p:cNvSpPr>
@@ -2127,7 +1925,7 @@
         <p:spPr>
           <a:xfrm>
             <a:off x="5152680" y="1326600"/>
-            <a:ext cx="4426920" cy="1568520"/>
+            <a:ext cx="4426920" cy="1568160"/>
           </a:xfrm>
           <a:prstGeom prst="rect">
             <a:avLst/>
@@ -2142,24 +1940,15 @@
             <a:normAutofit/>
           </a:bodyPr>
           <a:p>
-            <a:pPr indent="0">
-              <a:spcBef>
-                <a:spcPts val="1417"/>
-              </a:spcBef>
-              <a:buNone/>
-            </a:pPr>
             <a:endParaRPr b="0" lang="en-US" sz="3200" spc="-1" strike="noStrike">
-              <a:solidFill>
-                <a:srgbClr val="000000"/>
-              </a:solidFill>
-              <a:latin typeface="Arial"/>
-            </a:endParaRPr>
-          </a:p>
-        </p:txBody>
-      </p:sp>
-      <p:sp>
-        <p:nvSpPr>
-          <p:cNvPr id="19" name="PlaceHolder 4"/>
+              <a:latin typeface="Arial"/>
+            </a:endParaRPr>
+          </a:p>
+        </p:txBody>
+      </p:sp>
+      <p:sp>
+        <p:nvSpPr>
+          <p:cNvPr id="21" name="PlaceHolder 4"/>
           <p:cNvSpPr>
             <a:spLocks noGrp="1"/>
           </p:cNvSpPr>
@@ -2169,8 +1958,8 @@
         </p:nvSpPr>
         <p:spPr>
           <a:xfrm>
-            <a:off x="5152680" y="3044520"/>
-            <a:ext cx="4426920" cy="1568520"/>
+            <a:off x="5152680" y="3044160"/>
+            <a:ext cx="4426920" cy="1568160"/>
           </a:xfrm>
           <a:prstGeom prst="rect">
             <a:avLst/>
@@ -2185,16 +1974,7 @@
             <a:normAutofit/>
           </a:bodyPr>
           <a:p>
-            <a:pPr indent="0">
-              <a:spcBef>
-                <a:spcPts val="1417"/>
-              </a:spcBef>
-              <a:buNone/>
-            </a:pPr>
             <a:endParaRPr b="0" lang="en-US" sz="3200" spc="-1" strike="noStrike">
-              <a:solidFill>
-                <a:srgbClr val="000000"/>
-              </a:solidFill>
               <a:latin typeface="Arial"/>
             </a:endParaRPr>
           </a:p>
@@ -2207,7 +1987,7 @@
             <a:spLocks noGrp="1"/>
           </p:cNvSpPr>
           <p:nvPr>
-            <p:ph type="ftr" idx="1"/>
+            <p:ph type="ftr" idx="2"/>
           </p:nvPr>
         </p:nvSpPr>
         <p:spPr/>
@@ -2227,14 +2007,14 @@
             <a:spLocks noGrp="1"/>
           </p:cNvSpPr>
           <p:nvPr>
-            <p:ph type="sldNum" idx="2"/>
-          </p:nvPr>
-        </p:nvSpPr>
-        <p:spPr/>
-        <p:txBody>
-          <a:bodyPr/>
-          <a:p>
-            <a:fld id="{1D560C90-C10C-4351-BCC9-5EB2C7735C7C}" type="slidenum">
+            <p:ph type="sldNum" idx="3"/>
+          </p:nvPr>
+        </p:nvSpPr>
+        <p:spPr/>
+        <p:txBody>
+          <a:bodyPr/>
+          <a:p>
+            <a:fld id="{DCD3408C-54EA-4F7F-931D-ECBE32174930}" type="slidenum">
               <a:t>&lt;#&gt;</a:t>
             </a:fld>
           </a:p>
@@ -2247,7 +2027,7 @@
             <a:spLocks noGrp="1"/>
           </p:cNvSpPr>
           <p:nvPr>
-            <p:ph type="dt" idx="3"/>
+            <p:ph type="dt" idx="1"/>
           </p:nvPr>
         </p:nvSpPr>
         <p:spPr/>
@@ -2285,7 +2065,7 @@
       </p:grpSpPr>
       <p:sp>
         <p:nvSpPr>
-          <p:cNvPr id="20" name="PlaceHolder 1"/>
+          <p:cNvPr id="22" name="PlaceHolder 1"/>
           <p:cNvSpPr>
             <a:spLocks noGrp="1"/>
           </p:cNvSpPr>
@@ -2296,7 +2076,7 @@
         <p:spPr>
           <a:xfrm>
             <a:off x="504000" y="226080"/>
-            <a:ext cx="9072000" cy="946440"/>
+            <a:ext cx="9071640" cy="946440"/>
           </a:xfrm>
           <a:prstGeom prst="rect">
             <a:avLst/>
@@ -2311,21 +2091,18 @@
             <a:noAutofit/>
           </a:bodyPr>
           <a:p>
-            <a:pPr indent="0" algn="ctr">
+            <a:pPr algn="ctr">
               <a:buNone/>
             </a:pPr>
             <a:endParaRPr b="0" lang="en-US" sz="4400" spc="-1" strike="noStrike">
-              <a:solidFill>
-                <a:srgbClr val="000000"/>
-              </a:solidFill>
-              <a:latin typeface="Arial"/>
-            </a:endParaRPr>
-          </a:p>
-        </p:txBody>
-      </p:sp>
-      <p:sp>
-        <p:nvSpPr>
-          <p:cNvPr id="21" name="PlaceHolder 2"/>
+              <a:latin typeface="Arial"/>
+            </a:endParaRPr>
+          </a:p>
+        </p:txBody>
+      </p:sp>
+      <p:sp>
+        <p:nvSpPr>
+          <p:cNvPr id="23" name="PlaceHolder 2"/>
           <p:cNvSpPr>
             <a:spLocks noGrp="1"/>
           </p:cNvSpPr>
@@ -2336,7 +2113,7 @@
         <p:spPr>
           <a:xfrm>
             <a:off x="504000" y="1326600"/>
-            <a:ext cx="4426920" cy="1568520"/>
+            <a:ext cx="4426920" cy="1568160"/>
           </a:xfrm>
           <a:prstGeom prst="rect">
             <a:avLst/>
@@ -2351,24 +2128,15 @@
             <a:normAutofit/>
           </a:bodyPr>
           <a:p>
-            <a:pPr indent="0">
-              <a:spcBef>
-                <a:spcPts val="1417"/>
-              </a:spcBef>
-              <a:buNone/>
-            </a:pPr>
             <a:endParaRPr b="0" lang="en-US" sz="3200" spc="-1" strike="noStrike">
-              <a:solidFill>
-                <a:srgbClr val="000000"/>
-              </a:solidFill>
-              <a:latin typeface="Arial"/>
-            </a:endParaRPr>
-          </a:p>
-        </p:txBody>
-      </p:sp>
-      <p:sp>
-        <p:nvSpPr>
-          <p:cNvPr id="22" name="PlaceHolder 3"/>
+              <a:latin typeface="Arial"/>
+            </a:endParaRPr>
+          </a:p>
+        </p:txBody>
+      </p:sp>
+      <p:sp>
+        <p:nvSpPr>
+          <p:cNvPr id="24" name="PlaceHolder 3"/>
           <p:cNvSpPr>
             <a:spLocks noGrp="1"/>
           </p:cNvSpPr>
@@ -2379,7 +2147,7 @@
         <p:spPr>
           <a:xfrm>
             <a:off x="5152680" y="1326600"/>
-            <a:ext cx="4426920" cy="1568520"/>
+            <a:ext cx="4426920" cy="1568160"/>
           </a:xfrm>
           <a:prstGeom prst="rect">
             <a:avLst/>
@@ -2394,24 +2162,15 @@
             <a:normAutofit/>
           </a:bodyPr>
           <a:p>
-            <a:pPr indent="0">
-              <a:spcBef>
-                <a:spcPts val="1417"/>
-              </a:spcBef>
-              <a:buNone/>
-            </a:pPr>
             <a:endParaRPr b="0" lang="en-US" sz="3200" spc="-1" strike="noStrike">
-              <a:solidFill>
-                <a:srgbClr val="000000"/>
-              </a:solidFill>
-              <a:latin typeface="Arial"/>
-            </a:endParaRPr>
-          </a:p>
-        </p:txBody>
-      </p:sp>
-      <p:sp>
-        <p:nvSpPr>
-          <p:cNvPr id="23" name="PlaceHolder 4"/>
+              <a:latin typeface="Arial"/>
+            </a:endParaRPr>
+          </a:p>
+        </p:txBody>
+      </p:sp>
+      <p:sp>
+        <p:nvSpPr>
+          <p:cNvPr id="25" name="PlaceHolder 4"/>
           <p:cNvSpPr>
             <a:spLocks noGrp="1"/>
           </p:cNvSpPr>
@@ -2421,8 +2180,8 @@
         </p:nvSpPr>
         <p:spPr>
           <a:xfrm>
-            <a:off x="504000" y="3044520"/>
-            <a:ext cx="9072000" cy="1568520"/>
+            <a:off x="504000" y="3044160"/>
+            <a:ext cx="9071640" cy="1568160"/>
           </a:xfrm>
           <a:prstGeom prst="rect">
             <a:avLst/>
@@ -2437,16 +2196,7 @@
             <a:normAutofit/>
           </a:bodyPr>
           <a:p>
-            <a:pPr indent="0">
-              <a:spcBef>
-                <a:spcPts val="1417"/>
-              </a:spcBef>
-              <a:buNone/>
-            </a:pPr>
             <a:endParaRPr b="0" lang="en-US" sz="3200" spc="-1" strike="noStrike">
-              <a:solidFill>
-                <a:srgbClr val="000000"/>
-              </a:solidFill>
               <a:latin typeface="Arial"/>
             </a:endParaRPr>
           </a:p>
@@ -2459,7 +2209,7 @@
             <a:spLocks noGrp="1"/>
           </p:cNvSpPr>
           <p:nvPr>
-            <p:ph type="ftr" idx="1"/>
+            <p:ph type="ftr" idx="2"/>
           </p:nvPr>
         </p:nvSpPr>
         <p:spPr/>
@@ -2479,14 +2229,14 @@
             <a:spLocks noGrp="1"/>
           </p:cNvSpPr>
           <p:nvPr>
-            <p:ph type="sldNum" idx="2"/>
-          </p:nvPr>
-        </p:nvSpPr>
-        <p:spPr/>
-        <p:txBody>
-          <a:bodyPr/>
-          <a:p>
-            <a:fld id="{D9F4CF99-1AB6-42FA-93D3-49F95A4DFBF6}" type="slidenum">
+            <p:ph type="sldNum" idx="3"/>
+          </p:nvPr>
+        </p:nvSpPr>
+        <p:spPr/>
+        <p:txBody>
+          <a:bodyPr/>
+          <a:p>
+            <a:fld id="{D4500983-07D0-4BC9-8AD0-76EBCF4174DE}" type="slidenum">
               <a:t>&lt;#&gt;</a:t>
             </a:fld>
           </a:p>
@@ -2499,7 +2249,7 @@
             <a:spLocks noGrp="1"/>
           </p:cNvSpPr>
           <p:nvPr>
-            <p:ph type="dt" idx="3"/>
+            <p:ph type="dt" idx="1"/>
           </p:nvPr>
         </p:nvSpPr>
         <p:spPr/>
@@ -2542,13 +2292,239 @@
             <a:spLocks noGrp="1"/>
           </p:cNvSpPr>
           <p:nvPr>
-            <p:ph type="ftr" idx="1"/>
-          </p:nvPr>
-        </p:nvSpPr>
-        <p:spPr>
-          <a:xfrm>
-            <a:off x="3447360" y="5165280"/>
-            <a:ext cx="3194640" cy="390240"/>
+            <p:ph type="title"/>
+          </p:nvPr>
+        </p:nvSpPr>
+        <p:spPr>
+          <a:xfrm>
+            <a:off x="504000" y="226080"/>
+            <a:ext cx="9071640" cy="946440"/>
+          </a:xfrm>
+          <a:prstGeom prst="rect">
+            <a:avLst/>
+          </a:prstGeom>
+          <a:noFill/>
+          <a:ln w="0">
+            <a:noFill/>
+          </a:ln>
+        </p:spPr>
+        <p:txBody>
+          <a:bodyPr lIns="0" rIns="0" tIns="0" bIns="0" anchor="ctr">
+            <a:noAutofit/>
+          </a:bodyPr>
+          <a:p>
+            <a:pPr algn="ctr">
+              <a:buNone/>
+            </a:pPr>
+            <a:r>
+              <a:rPr b="0" lang="en-US" sz="4400" spc="-1" strike="noStrike">
+                <a:latin typeface="Arial"/>
+              </a:rPr>
+              <a:t>Click to edit the title text format</a:t>
+            </a:r>
+            <a:endParaRPr b="0" lang="en-US" sz="4400" spc="-1" strike="noStrike">
+              <a:latin typeface="Arial"/>
+            </a:endParaRPr>
+          </a:p>
+        </p:txBody>
+      </p:sp>
+      <p:sp>
+        <p:nvSpPr>
+          <p:cNvPr id="1" name="PlaceHolder 2"/>
+          <p:cNvSpPr>
+            <a:spLocks noGrp="1"/>
+          </p:cNvSpPr>
+          <p:nvPr>
+            <p:ph type="body"/>
+          </p:nvPr>
+        </p:nvSpPr>
+        <p:spPr>
+          <a:xfrm>
+            <a:off x="504000" y="1326600"/>
+            <a:ext cx="9071640" cy="3288240"/>
+          </a:xfrm>
+          <a:prstGeom prst="rect">
+            <a:avLst/>
+          </a:prstGeom>
+          <a:noFill/>
+          <a:ln w="0">
+            <a:noFill/>
+          </a:ln>
+        </p:spPr>
+        <p:txBody>
+          <a:bodyPr lIns="0" rIns="0" tIns="0" bIns="0" anchor="t">
+            <a:normAutofit/>
+          </a:bodyPr>
+          <a:p>
+            <a:pPr marL="432000" indent="-324000">
+              <a:spcBef>
+                <a:spcPts val="1417"/>
+              </a:spcBef>
+              <a:buClr>
+                <a:srgbClr val="000000"/>
+              </a:buClr>
+              <a:buSzPct val="45000"/>
+              <a:buFont typeface="Wingdings" charset="2"/>
+              <a:buChar char=""/>
+            </a:pPr>
+            <a:r>
+              <a:rPr b="0" lang="en-US" sz="3200" spc="-1" strike="noStrike">
+                <a:latin typeface="Arial"/>
+              </a:rPr>
+              <a:t>Click to edit the outline text format</a:t>
+            </a:r>
+            <a:endParaRPr b="0" lang="en-US" sz="3200" spc="-1" strike="noStrike">
+              <a:latin typeface="Arial"/>
+            </a:endParaRPr>
+          </a:p>
+          <a:p>
+            <a:pPr lvl="1" marL="864000" indent="-324000">
+              <a:spcBef>
+                <a:spcPts val="1134"/>
+              </a:spcBef>
+              <a:buClr>
+                <a:srgbClr val="000000"/>
+              </a:buClr>
+              <a:buSzPct val="75000"/>
+              <a:buFont typeface="Symbol" charset="2"/>
+              <a:buChar char=""/>
+            </a:pPr>
+            <a:r>
+              <a:rPr b="0" lang="en-US" sz="2800" spc="-1" strike="noStrike">
+                <a:latin typeface="Arial"/>
+              </a:rPr>
+              <a:t>Second Outline Level</a:t>
+            </a:r>
+            <a:endParaRPr b="0" lang="en-US" sz="2800" spc="-1" strike="noStrike">
+              <a:latin typeface="Arial"/>
+            </a:endParaRPr>
+          </a:p>
+          <a:p>
+            <a:pPr lvl="2" marL="1296000" indent="-288000">
+              <a:spcBef>
+                <a:spcPts val="850"/>
+              </a:spcBef>
+              <a:buClr>
+                <a:srgbClr val="000000"/>
+              </a:buClr>
+              <a:buSzPct val="45000"/>
+              <a:buFont typeface="Wingdings" charset="2"/>
+              <a:buChar char=""/>
+            </a:pPr>
+            <a:r>
+              <a:rPr b="0" lang="en-US" sz="2400" spc="-1" strike="noStrike">
+                <a:latin typeface="Arial"/>
+              </a:rPr>
+              <a:t>Third Outline Level</a:t>
+            </a:r>
+            <a:endParaRPr b="0" lang="en-US" sz="2400" spc="-1" strike="noStrike">
+              <a:latin typeface="Arial"/>
+            </a:endParaRPr>
+          </a:p>
+          <a:p>
+            <a:pPr lvl="3" marL="1728000" indent="-216000">
+              <a:spcBef>
+                <a:spcPts val="567"/>
+              </a:spcBef>
+              <a:buClr>
+                <a:srgbClr val="000000"/>
+              </a:buClr>
+              <a:buSzPct val="75000"/>
+              <a:buFont typeface="Symbol" charset="2"/>
+              <a:buChar char=""/>
+            </a:pPr>
+            <a:r>
+              <a:rPr b="0" lang="en-US" sz="2000" spc="-1" strike="noStrike">
+                <a:latin typeface="Arial"/>
+              </a:rPr>
+              <a:t>Fourth Outline Level</a:t>
+            </a:r>
+            <a:endParaRPr b="0" lang="en-US" sz="2000" spc="-1" strike="noStrike">
+              <a:latin typeface="Arial"/>
+            </a:endParaRPr>
+          </a:p>
+          <a:p>
+            <a:pPr lvl="4" marL="2160000" indent="-216000">
+              <a:spcBef>
+                <a:spcPts val="283"/>
+              </a:spcBef>
+              <a:buClr>
+                <a:srgbClr val="000000"/>
+              </a:buClr>
+              <a:buSzPct val="45000"/>
+              <a:buFont typeface="Wingdings" charset="2"/>
+              <a:buChar char=""/>
+            </a:pPr>
+            <a:r>
+              <a:rPr b="0" lang="en-US" sz="2000" spc="-1" strike="noStrike">
+                <a:latin typeface="Arial"/>
+              </a:rPr>
+              <a:t>Fifth Outline Level</a:t>
+            </a:r>
+            <a:endParaRPr b="0" lang="en-US" sz="2000" spc="-1" strike="noStrike">
+              <a:latin typeface="Arial"/>
+            </a:endParaRPr>
+          </a:p>
+          <a:p>
+            <a:pPr lvl="5" marL="2592000" indent="-216000">
+              <a:spcBef>
+                <a:spcPts val="283"/>
+              </a:spcBef>
+              <a:buClr>
+                <a:srgbClr val="000000"/>
+              </a:buClr>
+              <a:buSzPct val="45000"/>
+              <a:buFont typeface="Wingdings" charset="2"/>
+              <a:buChar char=""/>
+            </a:pPr>
+            <a:r>
+              <a:rPr b="0" lang="en-US" sz="2000" spc="-1" strike="noStrike">
+                <a:latin typeface="Arial"/>
+              </a:rPr>
+              <a:t>Sixth Outline Level</a:t>
+            </a:r>
+            <a:endParaRPr b="0" lang="en-US" sz="2000" spc="-1" strike="noStrike">
+              <a:latin typeface="Arial"/>
+            </a:endParaRPr>
+          </a:p>
+          <a:p>
+            <a:pPr lvl="6" marL="3024000" indent="-216000">
+              <a:spcBef>
+                <a:spcPts val="283"/>
+              </a:spcBef>
+              <a:buClr>
+                <a:srgbClr val="000000"/>
+              </a:buClr>
+              <a:buSzPct val="45000"/>
+              <a:buFont typeface="Wingdings" charset="2"/>
+              <a:buChar char=""/>
+            </a:pPr>
+            <a:r>
+              <a:rPr b="0" lang="en-US" sz="2000" spc="-1" strike="noStrike">
+                <a:latin typeface="Arial"/>
+              </a:rPr>
+              <a:t>Seventh Outline Level</a:t>
+            </a:r>
+            <a:endParaRPr b="0" lang="en-US" sz="2000" spc="-1" strike="noStrike">
+              <a:latin typeface="Arial"/>
+            </a:endParaRPr>
+          </a:p>
+        </p:txBody>
+      </p:sp>
+      <p:sp>
+        <p:nvSpPr>
+          <p:cNvPr id="2" name="PlaceHolder 3"/>
+          <p:cNvSpPr>
+            <a:spLocks noGrp="1"/>
+          </p:cNvSpPr>
+          <p:nvPr>
+            <p:ph type="dt" idx="1"/>
+          </p:nvPr>
+        </p:nvSpPr>
+        <p:spPr>
+          <a:xfrm>
+            <a:off x="504000" y="5165280"/>
+            <a:ext cx="2348280" cy="390600"/>
           </a:xfrm>
           <a:prstGeom prst="rect">
             <a:avLst/>
@@ -2563,39 +2539,20 @@
             <a:noAutofit/>
           </a:bodyPr>
           <a:lstStyle>
-            <a:lvl1pPr indent="0" algn="ctr">
-              <a:lnSpc>
-                <a:spcPct val="100000"/>
-              </a:lnSpc>
-              <a:buNone/>
+            <a:lvl1pPr>
               <a:defRPr b="0" lang="en-US" sz="1400" spc="-1" strike="noStrike">
-                <a:solidFill>
-                  <a:srgbClr val="000000"/>
-                </a:solidFill>
                 <a:latin typeface="Times New Roman"/>
               </a:defRPr>
             </a:lvl1pPr>
           </a:lstStyle>
           <a:p>
-            <a:pPr indent="0" algn="ctr">
-              <a:lnSpc>
-                <a:spcPct val="100000"/>
-              </a:lnSpc>
-              <a:buNone/>
-            </a:pPr>
             <a:r>
               <a:rPr b="0" lang="en-US" sz="1400" spc="-1" strike="noStrike">
-                <a:solidFill>
-                  <a:srgbClr val="000000"/>
-                </a:solidFill>
                 <a:latin typeface="Times New Roman"/>
               </a:rPr>
-              <a:t> </a:t>
+              <a:t>&lt;date/time&gt;</a:t>
             </a:r>
             <a:endParaRPr b="0" lang="en-US" sz="1400" spc="-1" strike="noStrike">
-              <a:solidFill>
-                <a:srgbClr val="000000"/>
-              </a:solidFill>
               <a:latin typeface="Times New Roman"/>
             </a:endParaRPr>
           </a:p>
@@ -2603,18 +2560,18 @@
       </p:sp>
       <p:sp>
         <p:nvSpPr>
-          <p:cNvPr id="1" name="PlaceHolder 2"/>
-          <p:cNvSpPr>
-            <a:spLocks noGrp="1"/>
-          </p:cNvSpPr>
-          <p:nvPr>
-            <p:ph type="sldNum" idx="2"/>
-          </p:nvPr>
-        </p:nvSpPr>
-        <p:spPr>
-          <a:xfrm>
-            <a:off x="7227360" y="5165280"/>
-            <a:ext cx="2347920" cy="390240"/>
+          <p:cNvPr id="3" name="PlaceHolder 4"/>
+          <p:cNvSpPr>
+            <a:spLocks noGrp="1"/>
+          </p:cNvSpPr>
+          <p:nvPr>
+            <p:ph type="ftr" idx="2"/>
+          </p:nvPr>
+        </p:nvSpPr>
+        <p:spPr>
+          <a:xfrm>
+            <a:off x="3447360" y="5165280"/>
+            <a:ext cx="3195000" cy="390600"/>
           </a:xfrm>
           <a:prstGeom prst="rect">
             <a:avLst/>
@@ -2629,39 +2586,24 @@
             <a:noAutofit/>
           </a:bodyPr>
           <a:lstStyle>
-            <a:lvl1pPr indent="0" algn="r">
-              <a:lnSpc>
-                <a:spcPct val="100000"/>
-              </a:lnSpc>
+            <a:lvl1pPr algn="ctr">
               <a:buNone/>
               <a:defRPr b="0" lang="en-US" sz="1400" spc="-1" strike="noStrike">
-                <a:solidFill>
-                  <a:srgbClr val="000000"/>
-                </a:solidFill>
                 <a:latin typeface="Times New Roman"/>
               </a:defRPr>
             </a:lvl1pPr>
           </a:lstStyle>
           <a:p>
-            <a:pPr indent="0" algn="r">
-              <a:lnSpc>
-                <a:spcPct val="100000"/>
-              </a:lnSpc>
+            <a:pPr algn="ctr">
               <a:buNone/>
             </a:pPr>
-            <a:fld id="{FD347139-9290-42F7-8794-1380DAD24F61}" type="slidenum">
+            <a:r>
               <a:rPr b="0" lang="en-US" sz="1400" spc="-1" strike="noStrike">
-                <a:solidFill>
-                  <a:srgbClr val="000000"/>
-                </a:solidFill>
                 <a:latin typeface="Times New Roman"/>
               </a:rPr>
-              <a:t>1</a:t>
-            </a:fld>
+              <a:t>&lt;footer&gt;</a:t>
+            </a:r>
             <a:endParaRPr b="0" lang="en-US" sz="1400" spc="-1" strike="noStrike">
-              <a:solidFill>
-                <a:srgbClr val="000000"/>
-              </a:solidFill>
               <a:latin typeface="Times New Roman"/>
             </a:endParaRPr>
           </a:p>
@@ -2669,18 +2611,18 @@
       </p:sp>
       <p:sp>
         <p:nvSpPr>
-          <p:cNvPr id="2" name="PlaceHolder 3"/>
-          <p:cNvSpPr>
-            <a:spLocks noGrp="1"/>
-          </p:cNvSpPr>
-          <p:nvPr>
-            <p:ph type="dt" idx="3"/>
-          </p:nvPr>
-        </p:nvSpPr>
-        <p:spPr>
-          <a:xfrm>
-            <a:off x="504000" y="5165280"/>
-            <a:ext cx="2347920" cy="390240"/>
+          <p:cNvPr id="4" name="PlaceHolder 5"/>
+          <p:cNvSpPr>
+            <a:spLocks noGrp="1"/>
+          </p:cNvSpPr>
+          <p:nvPr>
+            <p:ph type="sldNum" idx="3"/>
+          </p:nvPr>
+        </p:nvSpPr>
+        <p:spPr>
+          <a:xfrm>
+            <a:off x="7227360" y="5165280"/>
+            <a:ext cx="2348280" cy="390600"/>
           </a:xfrm>
           <a:prstGeom prst="rect">
             <a:avLst/>
@@ -2695,33 +2637,24 @@
             <a:noAutofit/>
           </a:bodyPr>
           <a:lstStyle>
-            <a:lvl1pPr indent="0">
+            <a:lvl1pPr algn="r">
               <a:buNone/>
               <a:defRPr b="0" lang="en-US" sz="1400" spc="-1" strike="noStrike">
-                <a:solidFill>
-                  <a:srgbClr val="000000"/>
-                </a:solidFill>
                 <a:latin typeface="Times New Roman"/>
               </a:defRPr>
             </a:lvl1pPr>
           </a:lstStyle>
           <a:p>
-            <a:pPr indent="0">
+            <a:pPr algn="r">
               <a:buNone/>
             </a:pPr>
-            <a:r>
+            <a:fld id="{CEC6C171-C0F7-46E6-8A7F-113F46686E1F}" type="slidenum">
               <a:rPr b="0" lang="en-US" sz="1400" spc="-1" strike="noStrike">
-                <a:solidFill>
-                  <a:srgbClr val="000000"/>
-                </a:solidFill>
                 <a:latin typeface="Times New Roman"/>
               </a:rPr>
-              <a:t> </a:t>
-            </a:r>
+              <a:t>&lt;number&gt;</a:t>
+            </a:fld>
             <a:endParaRPr b="0" lang="en-US" sz="1400" spc="-1" strike="noStrike">
-              <a:solidFill>
-                <a:srgbClr val="000000"/>
-              </a:solidFill>
               <a:latin typeface="Times New Roman"/>
             </a:endParaRPr>
           </a:p>
@@ -2766,7 +2699,7 @@
       </p:grpSpPr>
       <p:pic>
         <p:nvPicPr>
-          <p:cNvPr id="39" name="" descr=""/>
+          <p:cNvPr id="41" name="" descr=""/>
           <p:cNvPicPr/>
           <p:nvPr/>
         </p:nvPicPr>
@@ -2777,7 +2710,7 @@
         <p:spPr>
           <a:xfrm>
             <a:off x="1025640" y="-4680"/>
-            <a:ext cx="8027640" cy="5669280"/>
+            <a:ext cx="8028000" cy="5669640"/>
           </a:xfrm>
           <a:prstGeom prst="rect">
             <a:avLst/>
@@ -2787,210 +2720,6 @@
           </a:ln>
         </p:spPr>
       </p:pic>
-      <p:sp>
-        <p:nvSpPr>
-          <p:cNvPr id="40" name=""/>
-          <p:cNvSpPr/>
-          <p:nvPr/>
-        </p:nvSpPr>
-        <p:spPr>
-          <a:xfrm rot="66000">
-            <a:off x="8908560" y="3659400"/>
-            <a:ext cx="1142640" cy="672840"/>
-          </a:xfrm>
-          <a:prstGeom prst="rect">
-            <a:avLst/>
-          </a:prstGeom>
-          <a:solidFill>
-            <a:srgbClr val="ffffff"/>
-          </a:solidFill>
-          <a:ln w="0">
-            <a:solidFill>
-              <a:srgbClr val="254061"/>
-            </a:solidFill>
-          </a:ln>
-        </p:spPr>
-        <p:style>
-          <a:lnRef idx="0"/>
-          <a:fillRef idx="0"/>
-          <a:effectRef idx="0"/>
-          <a:fontRef idx="minor"/>
-        </p:style>
-        <p:txBody>
-          <a:bodyPr lIns="90000" rIns="90000" tIns="45000" bIns="45000" anchor="ctr">
-            <a:noAutofit/>
-          </a:bodyPr>
-          <a:p>
-            <a:pPr algn="ctr"/>
-            <a:r>
-              <a:rPr b="0" lang="en-US" sz="1400" spc="-1" strike="noStrike">
-                <a:solidFill>
-                  <a:srgbClr val="000000"/>
-                </a:solidFill>
-                <a:latin typeface="Arial"/>
-              </a:rPr>
-              <a:t>DONATION</a:t>
-            </a:r>
-            <a:endParaRPr b="0" lang="en-US" sz="1400" spc="-1" strike="noStrike">
-              <a:solidFill>
-                <a:srgbClr val="000000"/>
-              </a:solidFill>
-              <a:latin typeface="Arial"/>
-            </a:endParaRPr>
-          </a:p>
-        </p:txBody>
-      </p:sp>
-      <p:sp>
-        <p:nvSpPr>
-          <p:cNvPr id="41" name=""/>
-          <p:cNvSpPr txBox="1"/>
-          <p:nvPr/>
-        </p:nvSpPr>
-        <p:spPr>
-          <a:xfrm>
-            <a:off x="9486720" y="3370680"/>
-            <a:ext cx="457200" cy="288720"/>
-          </a:xfrm>
-          <a:prstGeom prst="rect">
-            <a:avLst/>
-          </a:prstGeom>
-          <a:noFill/>
-          <a:ln w="0">
-            <a:noFill/>
-          </a:ln>
-        </p:spPr>
-        <p:txBody>
-          <a:bodyPr lIns="90000" rIns="90000" tIns="45000" bIns="45000" anchor="t">
-            <a:noAutofit/>
-          </a:bodyPr>
-          <a:p>
-            <a:r>
-              <a:rPr b="0" lang="en-US" sz="1400" spc="-1" strike="noStrike">
-                <a:solidFill>
-                  <a:srgbClr val="000000"/>
-                </a:solidFill>
-                <a:latin typeface="Arial"/>
-              </a:rPr>
-              <a:t>M</a:t>
-            </a:r>
-            <a:endParaRPr b="0" lang="en-US" sz="1400" spc="-1" strike="noStrike">
-              <a:solidFill>
-                <a:srgbClr val="000000"/>
-              </a:solidFill>
-              <a:latin typeface="Arial"/>
-            </a:endParaRPr>
-          </a:p>
-        </p:txBody>
-      </p:sp>
-      <p:sp>
-        <p:nvSpPr>
-          <p:cNvPr id="42" name=""/>
-          <p:cNvSpPr txBox="1"/>
-          <p:nvPr/>
-        </p:nvSpPr>
-        <p:spPr>
-          <a:xfrm>
-            <a:off x="8159400" y="2829960"/>
-            <a:ext cx="457200" cy="288720"/>
-          </a:xfrm>
-          <a:prstGeom prst="rect">
-            <a:avLst/>
-          </a:prstGeom>
-          <a:noFill/>
-          <a:ln w="0">
-            <a:noFill/>
-          </a:ln>
-        </p:spPr>
-        <p:txBody>
-          <a:bodyPr lIns="90000" rIns="90000" tIns="45000" bIns="45000" anchor="t">
-            <a:noAutofit/>
-          </a:bodyPr>
-          <a:p>
-            <a:r>
-              <a:rPr b="0" lang="en-US" sz="1400" spc="-1" strike="noStrike">
-                <a:solidFill>
-                  <a:srgbClr val="000000"/>
-                </a:solidFill>
-                <a:latin typeface="Arial"/>
-              </a:rPr>
-              <a:t>1</a:t>
-            </a:r>
-            <a:endParaRPr b="0" lang="en-US" sz="1400" spc="-1" strike="noStrike">
-              <a:solidFill>
-                <a:srgbClr val="000000"/>
-              </a:solidFill>
-              <a:latin typeface="Arial"/>
-            </a:endParaRPr>
-          </a:p>
-        </p:txBody>
-      </p:sp>
-      <p:sp>
-        <p:nvSpPr>
-          <p:cNvPr id="43" name=""/>
-          <p:cNvSpPr/>
-          <p:nvPr/>
-        </p:nvSpPr>
-        <p:spPr>
-          <a:xfrm>
-            <a:off x="7916400" y="2995200"/>
-            <a:ext cx="228600" cy="228600"/>
-          </a:xfrm>
-          <a:prstGeom prst="rect">
-            <a:avLst/>
-          </a:prstGeom>
-          <a:solidFill>
-            <a:srgbClr val="ffffff"/>
-          </a:solidFill>
-          <a:ln w="0">
-            <a:solidFill>
-              <a:srgbClr val="254061"/>
-            </a:solidFill>
-          </a:ln>
-        </p:spPr>
-        <p:style>
-          <a:lnRef idx="0"/>
-          <a:fillRef idx="0"/>
-          <a:effectRef idx="0"/>
-          <a:fontRef idx="minor"/>
-        </p:style>
-        <p:txBody>
-          <a:bodyPr lIns="90000" rIns="90000" tIns="45000" bIns="45000" anchor="ctr">
-            <a:noAutofit/>
-          </a:bodyPr>
-          <a:p>
-            <a:endParaRPr b="0" lang="en-US" sz="1400" spc="-1" strike="noStrike">
-              <a:solidFill>
-                <a:srgbClr val="000000"/>
-              </a:solidFill>
-              <a:latin typeface="Arial"/>
-            </a:endParaRPr>
-          </a:p>
-        </p:txBody>
-      </p:sp>
-      <p:cxnSp>
-        <p:nvCxnSpPr>
-          <p:cNvPr id="44" name=""/>
-          <p:cNvCxnSpPr>
-            <a:stCxn id="43" idx="3"/>
-            <a:endCxn id="40" idx="0"/>
-          </p:cNvCxnSpPr>
-          <p:nvPr/>
-        </p:nvCxnSpPr>
-        <p:spPr>
-          <a:xfrm>
-            <a:off x="8145000" y="3109320"/>
-            <a:ext cx="1342080" cy="550440"/>
-          </a:xfrm>
-          <a:prstGeom prst="bentConnector2">
-            <a:avLst/>
-          </a:prstGeom>
-          <a:ln w="0">
-            <a:solidFill>
-              <a:srgbClr val="254061"/>
-            </a:solidFill>
-          </a:ln>
-        </p:spPr>
-      </p:cxnSp>
     </p:spTree>
   </p:cSld>
   <mc:AlternateContent>
@@ -3009,10 +2738,10 @@
   <a:themeElements>
     <a:clrScheme name="Office">
       <a:dk1>
-        <a:srgbClr val="000000"/>
+        <a:sysClr val="windowText" lastClr="000000"/>
       </a:dk1>
       <a:lt1>
-        <a:srgbClr val="ffffff"/>
+        <a:sysClr val="window" lastClr="FFFFFF"/>
       </a:lt1>
       <a:dk2>
         <a:srgbClr val="1f497d"/>
@@ -3110,7 +2839,7 @@
         </a:gradFill>
       </a:fillStyleLst>
       <a:lnStyleLst>
-        <a:ln w="6350" cap="flat" cmpd="sng" algn="ctr">
+        <a:ln w="9525" cap="flat" cmpd="sng" algn="ctr">
           <a:solidFill>
             <a:schemeClr val="phClr">
               <a:shade val="95000"/>
@@ -3120,14 +2849,14 @@
           <a:prstDash val="solid"/>
           <a:miter/>
         </a:ln>
-        <a:ln w="12700" cap="flat" cmpd="sng" algn="ctr">
+        <a:ln w="25400" cap="flat" cmpd="sng" algn="ctr">
           <a:solidFill>
             <a:schemeClr val="phClr"/>
           </a:solidFill>
           <a:prstDash val="solid"/>
           <a:miter/>
         </a:ln>
-        <a:ln w="19050" cap="flat" cmpd="sng" algn="ctr">
+        <a:ln w="38100" cap="flat" cmpd="sng" algn="ctr">
           <a:solidFill>
             <a:schemeClr val="phClr"/>
           </a:solidFill>
@@ -3137,10 +2866,13 @@
       </a:lnStyleLst>
       <a:effectStyleLst>
         <a:effectStyle>
-          <a:effectLst/>
-        </a:effectStyle>
-        <a:effectStyle>
-          <a:effectLst/>
+          <a:effectLst>
+            <a:outerShdw blurRad="40000" dist="20000" dir="5400000" rotWithShape="0">
+              <a:srgbClr val="000000">
+                <a:alpha val="38000"/>
+              </a:srgbClr>
+            </a:outerShdw>
+          </a:effectLst>
         </a:effectStyle>
         <a:effectStyle>
           <a:effectLst>
@@ -3150,6 +2882,26 @@
               </a:srgbClr>
             </a:outerShdw>
           </a:effectLst>
+        </a:effectStyle>
+        <a:effectStyle>
+          <a:effectLst>
+            <a:outerShdw blurRad="40000" dist="23000" dir="5400000" rotWithShape="0">
+              <a:srgbClr val="000000">
+                <a:alpha val="35000"/>
+              </a:srgbClr>
+            </a:outerShdw>
+          </a:effectLst>
+          <a:scene3d>
+            <a:camera prst="orthographicFront">
+              <a:rot lat="0" lon="0" rev="0"/>
+            </a:camera>
+            <a:lightRig rig="threePt" dir="t">
+              <a:rot lat="0" lon="0" rev="1200000"/>
+            </a:lightRig>
+          </a:scene3d>
+          <a:sp3d>
+            <a:bevelT w="63500" h="25400"/>
+          </a:sp3d>
         </a:effectStyle>
       </a:effectStyleLst>
       <a:bgFillStyleLst>

</xml_diff>